<commit_message>
MediaStore.ACTION_IMAGE_CAPTURE 사용하여 사진 촬영
</commit_message>
<xml_diff>
--- a/꽃어플리케이션.pptx
+++ b/꽃어플리케이션.pptx
@@ -5,7 +5,7 @@
     <p:sldMasterId id="2147483648" r:id="rId1"/>
   </p:sldMasterIdLst>
   <p:notesMasterIdLst>
-    <p:notesMasterId r:id="rId15"/>
+    <p:notesMasterId r:id="rId23"/>
   </p:notesMasterIdLst>
   <p:sldIdLst>
     <p:sldId id="257" r:id="rId2"/>
@@ -14,13 +14,21 @@
     <p:sldId id="260" r:id="rId5"/>
     <p:sldId id="261" r:id="rId6"/>
     <p:sldId id="262" r:id="rId7"/>
-    <p:sldId id="263" r:id="rId8"/>
-    <p:sldId id="264" r:id="rId9"/>
-    <p:sldId id="265" r:id="rId10"/>
-    <p:sldId id="267" r:id="rId11"/>
-    <p:sldId id="269" r:id="rId12"/>
-    <p:sldId id="268" r:id="rId13"/>
-    <p:sldId id="270" r:id="rId14"/>
+    <p:sldId id="279" r:id="rId8"/>
+    <p:sldId id="278" r:id="rId9"/>
+    <p:sldId id="263" r:id="rId10"/>
+    <p:sldId id="264" r:id="rId11"/>
+    <p:sldId id="265" r:id="rId12"/>
+    <p:sldId id="267" r:id="rId13"/>
+    <p:sldId id="269" r:id="rId14"/>
+    <p:sldId id="268" r:id="rId15"/>
+    <p:sldId id="270" r:id="rId16"/>
+    <p:sldId id="272" r:id="rId17"/>
+    <p:sldId id="273" r:id="rId18"/>
+    <p:sldId id="274" r:id="rId19"/>
+    <p:sldId id="275" r:id="rId20"/>
+    <p:sldId id="276" r:id="rId21"/>
+    <p:sldId id="277" r:id="rId22"/>
   </p:sldIdLst>
   <p:sldSz cx="9906000" cy="6858000" type="A4"/>
   <p:notesSz cx="6807200" cy="9939338"/>
@@ -220,7 +228,7 @@
           <a:p>
             <a:fld id="{DE63D616-C29A-4555-B8AA-4C6BF90DCB02}" type="datetimeFigureOut">
               <a:rPr lang="ko-KR" altLang="en-US" smtClean="0"/>
-              <a:t>2022-08-03</a:t>
+              <a:t>2022-08-11</a:t>
             </a:fld>
             <a:endParaRPr lang="ko-KR" altLang="en-US"/>
           </a:p>
@@ -750,7 +758,7 @@
           <a:p>
             <a:fld id="{DAA841E7-7888-47B9-9169-94D5699A96C2}" type="datetimeFigureOut">
               <a:rPr lang="ko-KR" altLang="en-US" smtClean="0"/>
-              <a:t>2022-08-03</a:t>
+              <a:t>2022-08-11</a:t>
             </a:fld>
             <a:endParaRPr lang="ko-KR" altLang="en-US"/>
           </a:p>
@@ -918,7 +926,7 @@
           <a:p>
             <a:fld id="{DAA841E7-7888-47B9-9169-94D5699A96C2}" type="datetimeFigureOut">
               <a:rPr lang="ko-KR" altLang="en-US" smtClean="0"/>
-              <a:t>2022-08-03</a:t>
+              <a:t>2022-08-11</a:t>
             </a:fld>
             <a:endParaRPr lang="ko-KR" altLang="en-US"/>
           </a:p>
@@ -1096,7 +1104,7 @@
           <a:p>
             <a:fld id="{DAA841E7-7888-47B9-9169-94D5699A96C2}" type="datetimeFigureOut">
               <a:rPr lang="ko-KR" altLang="en-US" smtClean="0"/>
-              <a:t>2022-08-03</a:t>
+              <a:t>2022-08-11</a:t>
             </a:fld>
             <a:endParaRPr lang="ko-KR" altLang="en-US"/>
           </a:p>
@@ -1264,7 +1272,7 @@
           <a:p>
             <a:fld id="{DAA841E7-7888-47B9-9169-94D5699A96C2}" type="datetimeFigureOut">
               <a:rPr lang="ko-KR" altLang="en-US" smtClean="0"/>
-              <a:t>2022-08-03</a:t>
+              <a:t>2022-08-11</a:t>
             </a:fld>
             <a:endParaRPr lang="ko-KR" altLang="en-US"/>
           </a:p>
@@ -1509,7 +1517,7 @@
           <a:p>
             <a:fld id="{DAA841E7-7888-47B9-9169-94D5699A96C2}" type="datetimeFigureOut">
               <a:rPr lang="ko-KR" altLang="en-US" smtClean="0"/>
-              <a:t>2022-08-03</a:t>
+              <a:t>2022-08-11</a:t>
             </a:fld>
             <a:endParaRPr lang="ko-KR" altLang="en-US"/>
           </a:p>
@@ -1794,7 +1802,7 @@
           <a:p>
             <a:fld id="{DAA841E7-7888-47B9-9169-94D5699A96C2}" type="datetimeFigureOut">
               <a:rPr lang="ko-KR" altLang="en-US" smtClean="0"/>
-              <a:t>2022-08-03</a:t>
+              <a:t>2022-08-11</a:t>
             </a:fld>
             <a:endParaRPr lang="ko-KR" altLang="en-US"/>
           </a:p>
@@ -2213,7 +2221,7 @@
           <a:p>
             <a:fld id="{DAA841E7-7888-47B9-9169-94D5699A96C2}" type="datetimeFigureOut">
               <a:rPr lang="ko-KR" altLang="en-US" smtClean="0"/>
-              <a:t>2022-08-03</a:t>
+              <a:t>2022-08-11</a:t>
             </a:fld>
             <a:endParaRPr lang="ko-KR" altLang="en-US"/>
           </a:p>
@@ -2330,7 +2338,7 @@
           <a:p>
             <a:fld id="{DAA841E7-7888-47B9-9169-94D5699A96C2}" type="datetimeFigureOut">
               <a:rPr lang="ko-KR" altLang="en-US" smtClean="0"/>
-              <a:t>2022-08-03</a:t>
+              <a:t>2022-08-11</a:t>
             </a:fld>
             <a:endParaRPr lang="ko-KR" altLang="en-US"/>
           </a:p>
@@ -2425,7 +2433,7 @@
           <a:p>
             <a:fld id="{DAA841E7-7888-47B9-9169-94D5699A96C2}" type="datetimeFigureOut">
               <a:rPr lang="ko-KR" altLang="en-US" smtClean="0"/>
-              <a:t>2022-08-03</a:t>
+              <a:t>2022-08-11</a:t>
             </a:fld>
             <a:endParaRPr lang="ko-KR" altLang="en-US"/>
           </a:p>
@@ -2700,7 +2708,7 @@
           <a:p>
             <a:fld id="{DAA841E7-7888-47B9-9169-94D5699A96C2}" type="datetimeFigureOut">
               <a:rPr lang="ko-KR" altLang="en-US" smtClean="0"/>
-              <a:t>2022-08-03</a:t>
+              <a:t>2022-08-11</a:t>
             </a:fld>
             <a:endParaRPr lang="ko-KR" altLang="en-US"/>
           </a:p>
@@ -2952,7 +2960,7 @@
           <a:p>
             <a:fld id="{DAA841E7-7888-47B9-9169-94D5699A96C2}" type="datetimeFigureOut">
               <a:rPr lang="ko-KR" altLang="en-US" smtClean="0"/>
-              <a:t>2022-08-03</a:t>
+              <a:t>2022-08-11</a:t>
             </a:fld>
             <a:endParaRPr lang="ko-KR" altLang="en-US"/>
           </a:p>
@@ -3163,7 +3171,7 @@
           <a:p>
             <a:fld id="{DAA841E7-7888-47B9-9169-94D5699A96C2}" type="datetimeFigureOut">
               <a:rPr lang="ko-KR" altLang="en-US" smtClean="0"/>
-              <a:t>2022-08-03</a:t>
+              <a:t>2022-08-11</a:t>
             </a:fld>
             <a:endParaRPr lang="ko-KR" altLang="en-US"/>
           </a:p>
@@ -19510,7 +19518,7 @@
           <p:cNvPr id="2" name="제목 1">
             <a:extLst>
               <a:ext uri="{FF2B5EF4-FFF2-40B4-BE49-F238E27FC236}">
-                <a16:creationId xmlns:a16="http://schemas.microsoft.com/office/drawing/2014/main" id="{11687D24-70FC-655B-1EC8-3A87D0F3E3E3}"/>
+                <a16:creationId xmlns:a16="http://schemas.microsoft.com/office/drawing/2014/main" id="{55E140B0-DD8D-541A-CF6C-533BB1ADAD9B}"/>
               </a:ext>
             </a:extLst>
           </p:cNvPr>
@@ -19523,157 +19531,31 @@
         </p:nvSpPr>
         <p:spPr/>
         <p:txBody>
-          <a:bodyPr/>
-          <a:lstStyle/>
-          <a:p>
-            <a:r>
-              <a:rPr lang="en-US" altLang="ko-KR" dirty="0" err="1"/>
-              <a:t>Plantnote</a:t>
-            </a:r>
-            <a:endParaRPr lang="ko-KR" altLang="en-US" dirty="0"/>
-          </a:p>
-        </p:txBody>
-      </p:sp>
-      <p:sp>
-        <p:nvSpPr>
-          <p:cNvPr id="3" name="내용 개체 틀 2">
-            <a:extLst>
-              <a:ext uri="{FF2B5EF4-FFF2-40B4-BE49-F238E27FC236}">
-                <a16:creationId xmlns:a16="http://schemas.microsoft.com/office/drawing/2014/main" id="{61430AE8-CBB1-EB9F-1616-181F87A1182A}"/>
-              </a:ext>
-            </a:extLst>
-          </p:cNvPr>
-          <p:cNvSpPr>
-            <a:spLocks noGrp="1"/>
-          </p:cNvSpPr>
-          <p:nvPr>
-            <p:ph idx="1"/>
-          </p:nvPr>
-        </p:nvSpPr>
-        <p:spPr/>
-        <p:txBody>
           <a:bodyPr>
             <a:normAutofit/>
           </a:bodyPr>
           <a:lstStyle/>
           <a:p>
             <a:r>
-              <a:rPr lang="ko-KR" altLang="en-US" sz="2000" dirty="0"/>
-              <a:t>구글 렌즈</a:t>
-            </a:r>
-            <a:r>
-              <a:rPr lang="en-US" altLang="ko-KR" sz="2000" dirty="0"/>
-              <a:t>’</a:t>
-            </a:r>
-            <a:r>
-              <a:rPr lang="ko-KR" altLang="en-US" sz="2000" dirty="0"/>
-              <a:t>로 식물 품종 확인하는 탭이 있음</a:t>
-            </a:r>
-            <a:endParaRPr lang="en-US" altLang="ko-KR" sz="2000" dirty="0"/>
-          </a:p>
-          <a:p>
-            <a:r>
-              <a:rPr lang="ko-KR" altLang="en-US" sz="2000" dirty="0"/>
-              <a:t>다만 식물등록은 품종 리스트에서 직접 선택 </a:t>
-            </a:r>
-            <a:r>
-              <a:rPr lang="en-US" altLang="ko-KR" sz="2000" dirty="0"/>
-              <a:t>( </a:t>
-            </a:r>
-            <a:r>
-              <a:rPr lang="ko-KR" altLang="en-US" sz="2000" dirty="0"/>
-              <a:t>분류모델 </a:t>
-            </a:r>
-            <a:r>
-              <a:rPr lang="ko-KR" altLang="en-US" sz="2000" dirty="0" err="1"/>
-              <a:t>쓰지않음</a:t>
-            </a:r>
-            <a:r>
-              <a:rPr lang="en-US" altLang="ko-KR" sz="2000" dirty="0"/>
-              <a:t>)</a:t>
-            </a:r>
-          </a:p>
-          <a:p>
-            <a:pPr lvl="1"/>
-            <a:r>
-              <a:rPr lang="ko-KR" altLang="en-US" sz="1600" dirty="0"/>
-              <a:t>식물 품종별이 아닌 과 별로 분류됨 </a:t>
-            </a:r>
-            <a:r>
-              <a:rPr lang="en-US" altLang="ko-KR" sz="1600" dirty="0"/>
-              <a:t>( </a:t>
-            </a:r>
-            <a:r>
-              <a:rPr lang="ko-KR" altLang="en-US" sz="1600" dirty="0"/>
-              <a:t>사용자가 추가가능 </a:t>
-            </a:r>
-            <a:r>
-              <a:rPr lang="en-US" altLang="ko-KR" sz="1600" dirty="0"/>
-              <a:t>)</a:t>
-            </a:r>
-          </a:p>
-          <a:p>
-            <a:r>
-              <a:rPr lang="ko-KR" altLang="en-US" sz="2000" dirty="0"/>
-              <a:t>식물정보 </a:t>
-            </a:r>
-            <a:r>
-              <a:rPr lang="en-US" altLang="ko-KR" sz="2000" dirty="0"/>
-              <a:t>( </a:t>
-            </a:r>
-            <a:r>
-              <a:rPr lang="ko-KR" altLang="en-US" sz="2000" dirty="0"/>
-              <a:t>전부 사용자가 직접 등록 </a:t>
-            </a:r>
-            <a:r>
-              <a:rPr lang="en-US" altLang="ko-KR" sz="2000" dirty="0"/>
-              <a:t>)</a:t>
-            </a:r>
-          </a:p>
-          <a:p>
-            <a:pPr lvl="1"/>
-            <a:r>
-              <a:rPr lang="ko-KR" altLang="en-US" sz="1600" dirty="0"/>
-              <a:t>식물 사진</a:t>
-            </a:r>
-            <a:endParaRPr lang="en-US" altLang="ko-KR" sz="1600" dirty="0"/>
-          </a:p>
-          <a:p>
-            <a:pPr lvl="1"/>
-            <a:r>
-              <a:rPr lang="ko-KR" altLang="en-US" sz="1600" dirty="0" err="1"/>
-              <a:t>마지막으로물준날</a:t>
-            </a:r>
-            <a:r>
-              <a:rPr lang="en-US" altLang="ko-KR" sz="1600" dirty="0"/>
-              <a:t>, </a:t>
-            </a:r>
-            <a:r>
-              <a:rPr lang="ko-KR" altLang="en-US" sz="1600" dirty="0"/>
-              <a:t>물주기</a:t>
-            </a:r>
-            <a:endParaRPr lang="en-US" altLang="ko-KR" sz="1600" dirty="0"/>
-          </a:p>
-          <a:p>
-            <a:r>
-              <a:rPr lang="ko-KR" altLang="en-US" sz="2000" dirty="0"/>
-              <a:t>근처 식물가게 찾기</a:t>
-            </a:r>
-            <a:endParaRPr lang="en-US" altLang="ko-KR" sz="2000" dirty="0"/>
-          </a:p>
-          <a:p>
-            <a:r>
-              <a:rPr lang="ko-KR" altLang="en-US" sz="2000" dirty="0"/>
-              <a:t>최근 식물 관련 기사 찾기</a:t>
-            </a:r>
-            <a:endParaRPr lang="en-US" altLang="ko-KR" sz="2000" dirty="0"/>
+              <a:rPr lang="en-US" altLang="ko-KR" dirty="0"/>
+              <a:t>Sample</a:t>
+            </a:r>
+            <a:r>
+              <a:rPr lang="ko-KR" altLang="en-US" dirty="0"/>
+              <a:t> </a:t>
+            </a:r>
+            <a:r>
+              <a:rPr lang="en-US" altLang="ko-KR" dirty="0"/>
+              <a:t>app</a:t>
+            </a:r>
+            <a:endParaRPr lang="ko-KR" altLang="en-US" dirty="0"/>
           </a:p>
         </p:txBody>
       </p:sp>
     </p:spTree>
     <p:extLst>
       <p:ext uri="{BB962C8B-B14F-4D97-AF65-F5344CB8AC3E}">
-        <p14:creationId xmlns:p14="http://schemas.microsoft.com/office/powerpoint/2010/main" val="876764507"/>
+        <p14:creationId xmlns:p14="http://schemas.microsoft.com/office/powerpoint/2010/main" val="322434159"/>
       </p:ext>
     </p:extLst>
   </p:cSld>
@@ -19722,8 +19604,8 @@
           <a:lstStyle/>
           <a:p>
             <a:r>
-              <a:rPr lang="ko-KR" altLang="en-US" dirty="0" err="1"/>
-              <a:t>그로우</a:t>
+              <a:rPr lang="en-US" altLang="ko-KR" dirty="0" err="1"/>
+              <a:t>Plantgram</a:t>
             </a:r>
             <a:endParaRPr lang="ko-KR" altLang="en-US" dirty="0"/>
           </a:p>
@@ -19745,12 +19627,7 @@
             <p:ph idx="1"/>
           </p:nvPr>
         </p:nvSpPr>
-        <p:spPr>
-          <a:xfrm>
-            <a:off x="495300" y="1600201"/>
-            <a:ext cx="8915400" cy="4525963"/>
-          </a:xfrm>
-        </p:spPr>
+        <p:spPr/>
         <p:txBody>
           <a:bodyPr>
             <a:normAutofit/>
@@ -19759,31 +19636,24 @@
           <a:p>
             <a:r>
               <a:rPr lang="ko-KR" altLang="en-US" sz="2000" dirty="0"/>
-              <a:t>전화번호로 로그인</a:t>
-            </a:r>
-            <a:endParaRPr lang="en-US" altLang="ko-KR" sz="2000" dirty="0"/>
-          </a:p>
-          <a:p>
+              <a:t>식물등록은 품종 리스트에서 직접 선택 </a:t>
+            </a:r>
+            <a:r>
+              <a:rPr lang="en-US" altLang="ko-KR" sz="2000" dirty="0"/>
+              <a:t>( </a:t>
+            </a:r>
             <a:r>
               <a:rPr lang="ko-KR" altLang="en-US" sz="2000" dirty="0"/>
-              <a:t>사진으로 식물 분류는 향후 추가 예정인 듯</a:t>
-            </a:r>
-            <a:endParaRPr lang="en-US" altLang="ko-KR" sz="2000" dirty="0"/>
-          </a:p>
-          <a:p>
-            <a:r>
-              <a:rPr lang="ko-KR" altLang="en-US" sz="2000" dirty="0"/>
-              <a:t>식물등록은 품종 리스트에서 직접 선택</a:t>
-            </a:r>
-            <a:endParaRPr lang="en-US" altLang="ko-KR" sz="1200" dirty="0"/>
-          </a:p>
-          <a:p>
-            <a:pPr lvl="1"/>
-            <a:r>
-              <a:rPr lang="ko-KR" altLang="en-US" sz="1600" dirty="0"/>
-              <a:t>많이 등록한 인기 품종순서로 보여줌</a:t>
-            </a:r>
-            <a:endParaRPr lang="en-US" altLang="ko-KR" sz="1600" dirty="0"/>
+              <a:t>분류모델 </a:t>
+            </a:r>
+            <a:r>
+              <a:rPr lang="ko-KR" altLang="en-US" sz="2000" dirty="0" err="1"/>
+              <a:t>쓰지않음</a:t>
+            </a:r>
+            <a:r>
+              <a:rPr lang="en-US" altLang="ko-KR" sz="2000" dirty="0"/>
+              <a:t>)</a:t>
+            </a:r>
           </a:p>
           <a:p>
             <a:r>
@@ -19807,15 +19677,39 @@
             <a:pPr lvl="1"/>
             <a:r>
               <a:rPr lang="ko-KR" altLang="en-US" sz="1600" dirty="0"/>
-              <a:t>조도</a:t>
+              <a:t>식물 사진 </a:t>
+            </a:r>
+            <a:r>
+              <a:rPr lang="en-US" altLang="ko-KR" sz="1600" dirty="0"/>
+              <a:t># </a:t>
+            </a:r>
+            <a:r>
+              <a:rPr lang="ko-KR" altLang="en-US" sz="1600" dirty="0"/>
+              <a:t>직접 등록</a:t>
+            </a:r>
+            <a:endParaRPr lang="en-US" altLang="ko-KR" sz="1600" dirty="0"/>
+          </a:p>
+          <a:p>
+            <a:pPr lvl="1"/>
+            <a:r>
+              <a:rPr lang="ko-KR" altLang="en-US" sz="1600" dirty="0"/>
+              <a:t>등록일자</a:t>
             </a:r>
             <a:r>
               <a:rPr lang="en-US" altLang="ko-KR" sz="1600" dirty="0"/>
               <a:t>,</a:t>
             </a:r>
             <a:r>
+              <a:rPr lang="ko-KR" altLang="en-US" sz="1600" dirty="0" err="1"/>
+              <a:t>마지막으로물준날</a:t>
+            </a:r>
+            <a:endParaRPr lang="en-US" altLang="ko-KR" sz="1600" dirty="0"/>
+          </a:p>
+          <a:p>
+            <a:pPr lvl="1"/>
+            <a:r>
               <a:rPr lang="ko-KR" altLang="en-US" sz="1600" dirty="0"/>
-              <a:t>온도</a:t>
+              <a:t>적절한 햇빛</a:t>
             </a:r>
             <a:r>
               <a:rPr lang="en-US" altLang="ko-KR" sz="1600" dirty="0"/>
@@ -19823,7 +19717,7 @@
             </a:r>
             <a:r>
               <a:rPr lang="ko-KR" altLang="en-US" sz="1600" dirty="0"/>
-              <a:t>습도</a:t>
+              <a:t>물</a:t>
             </a:r>
             <a:r>
               <a:rPr lang="en-US" altLang="ko-KR" sz="1600" dirty="0"/>
@@ -19831,114 +19725,101 @@
             </a:r>
             <a:r>
               <a:rPr lang="ko-KR" altLang="en-US" sz="1600" dirty="0"/>
-              <a:t>날씨</a:t>
+              <a:t>온도 및 관리 주기 </a:t>
             </a:r>
             <a:r>
               <a:rPr lang="en-US" altLang="ko-KR" sz="1600" dirty="0"/>
-              <a:t>,</a:t>
+              <a:t># </a:t>
             </a:r>
             <a:r>
               <a:rPr lang="ko-KR" altLang="en-US" sz="1600" dirty="0"/>
-              <a:t>환기</a:t>
+              <a:t>기본값이 있지만 변경가능</a:t>
+            </a:r>
+            <a:endParaRPr lang="en-US" altLang="ko-KR" sz="1600" dirty="0"/>
+          </a:p>
+          <a:p>
+            <a:pPr lvl="1"/>
+            <a:r>
+              <a:rPr lang="ko-KR" altLang="en-US" sz="1600" dirty="0"/>
+              <a:t>최근 관리내역 </a:t>
             </a:r>
             <a:r>
               <a:rPr lang="en-US" altLang="ko-KR" sz="1600" dirty="0"/>
-              <a:t>,</a:t>
+              <a:t># </a:t>
             </a:r>
             <a:r>
               <a:rPr lang="ko-KR" altLang="en-US" sz="1600" dirty="0"/>
-              <a:t>가지치기 주기 및 정도</a:t>
+              <a:t>자동 등록</a:t>
             </a:r>
             <a:endParaRPr lang="en-US" altLang="ko-KR" sz="1600" dirty="0"/>
           </a:p>
           <a:p>
+            <a:r>
+              <a:rPr lang="ko-KR" altLang="en-US" sz="2000" dirty="0" err="1"/>
+              <a:t>식물별</a:t>
+            </a:r>
+            <a:r>
+              <a:rPr lang="ko-KR" altLang="en-US" sz="2000" dirty="0"/>
+              <a:t> </a:t>
+            </a:r>
+            <a:r>
+              <a:rPr lang="en-US" altLang="ko-KR" sz="2000" dirty="0" err="1"/>
+              <a:t>qr</a:t>
+            </a:r>
+            <a:r>
+              <a:rPr lang="ko-KR" altLang="en-US" sz="2000" dirty="0"/>
+              <a:t>코드 생성 후 </a:t>
+            </a:r>
+            <a:r>
+              <a:rPr lang="ko-KR" altLang="en-US" sz="2000" dirty="0" err="1"/>
+              <a:t>물줬다는</a:t>
+            </a:r>
+            <a:r>
+              <a:rPr lang="ko-KR" altLang="en-US" sz="2000" dirty="0"/>
+              <a:t> 확인을 </a:t>
+            </a:r>
+            <a:r>
+              <a:rPr lang="en-US" altLang="ko-KR" sz="2000" dirty="0" err="1"/>
+              <a:t>qr</a:t>
+            </a:r>
+            <a:r>
+              <a:rPr lang="ko-KR" altLang="en-US" sz="2000" dirty="0"/>
+              <a:t>코드로 </a:t>
+            </a:r>
+            <a:r>
+              <a:rPr lang="ko-KR" altLang="en-US" sz="2000" dirty="0" err="1"/>
+              <a:t>직접함</a:t>
+            </a:r>
+            <a:endParaRPr lang="en-US" altLang="ko-KR" sz="2000" dirty="0"/>
+          </a:p>
+          <a:p>
+            <a:r>
+              <a:rPr lang="ko-KR" altLang="en-US" sz="2000" dirty="0"/>
+              <a:t>식물관련 도구 및 가구장터</a:t>
+            </a:r>
+            <a:endParaRPr lang="en-US" altLang="ko-KR" sz="2000" dirty="0"/>
+          </a:p>
+          <a:p>
+            <a:r>
+              <a:rPr lang="ko-KR" altLang="en-US" sz="2000" dirty="0" err="1"/>
+              <a:t>사용자들간에</a:t>
+            </a:r>
+            <a:r>
+              <a:rPr lang="ko-KR" altLang="en-US" sz="2000" dirty="0"/>
+              <a:t> 식물관리정보 공유 및 질의응답</a:t>
+            </a:r>
+            <a:endParaRPr lang="en-US" altLang="ko-KR" sz="2000" dirty="0"/>
+          </a:p>
+          <a:p>
             <a:pPr lvl="1"/>
-            <a:r>
-              <a:rPr lang="ko-KR" altLang="en-US" sz="1600" dirty="0" err="1"/>
-              <a:t>식물키울</a:t>
-            </a:r>
-            <a:r>
-              <a:rPr lang="ko-KR" altLang="en-US" sz="1600" dirty="0"/>
-              <a:t> 환경을 설문한 후 알맞은 관리정보 자동 세팅 </a:t>
-            </a:r>
             <a:endParaRPr lang="en-US" altLang="ko-KR" sz="1600" dirty="0"/>
-          </a:p>
-          <a:p>
-            <a:pPr marL="457200" lvl="1" indent="0">
-              <a:buNone/>
-            </a:pPr>
-            <a:r>
-              <a:rPr lang="en-US" altLang="ko-KR" sz="1600" dirty="0"/>
-              <a:t>( </a:t>
-            </a:r>
-            <a:r>
-              <a:rPr lang="ko-KR" altLang="en-US" sz="1600" dirty="0"/>
-              <a:t>마찬가지로 회사 데이터베이스 있는듯</a:t>
-            </a:r>
-            <a:r>
-              <a:rPr lang="en-US" altLang="ko-KR" sz="1600" dirty="0"/>
-              <a:t>)</a:t>
-            </a:r>
-          </a:p>
-          <a:p>
-            <a:pPr lvl="1"/>
-            <a:r>
-              <a:rPr lang="ko-KR" altLang="en-US" sz="1600" dirty="0" err="1"/>
-              <a:t>식물별</a:t>
-            </a:r>
-            <a:r>
-              <a:rPr lang="ko-KR" altLang="en-US" sz="1600" dirty="0"/>
-              <a:t> 주의사항</a:t>
-            </a:r>
-            <a:endParaRPr lang="en-US" altLang="ko-KR" sz="1600" dirty="0"/>
-          </a:p>
-          <a:p>
-            <a:pPr lvl="1"/>
-            <a:r>
-              <a:rPr lang="ko-KR" altLang="en-US" sz="1600" dirty="0" err="1"/>
-              <a:t>식물별</a:t>
-            </a:r>
-            <a:r>
-              <a:rPr lang="ko-KR" altLang="en-US" sz="1600" dirty="0"/>
-              <a:t> 오픈채팅 링크</a:t>
-            </a:r>
-            <a:endParaRPr lang="en-US" altLang="ko-KR" sz="1600" dirty="0"/>
-          </a:p>
-          <a:p>
-            <a:r>
-              <a:rPr lang="ko-KR" altLang="en-US" sz="2000" dirty="0"/>
-              <a:t>친구와 채팅 및 오픈채팅 기능</a:t>
-            </a:r>
-            <a:endParaRPr lang="en-US" altLang="ko-KR" sz="2000" dirty="0"/>
-          </a:p>
-          <a:p>
-            <a:r>
-              <a:rPr lang="en-US" altLang="ko-KR" sz="2000" dirty="0"/>
-              <a:t>AI</a:t>
-            </a:r>
-            <a:r>
-              <a:rPr lang="ko-KR" altLang="en-US" sz="2000" dirty="0"/>
-              <a:t>를 통한 식물 상태 진단 기능 </a:t>
-            </a:r>
-            <a:r>
-              <a:rPr lang="en-US" altLang="ko-KR" sz="2000" dirty="0"/>
-              <a:t>( </a:t>
-            </a:r>
-            <a:r>
-              <a:rPr lang="ko-KR" altLang="en-US" sz="2000" dirty="0"/>
-              <a:t>잘 안됨 </a:t>
-            </a:r>
-            <a:r>
-              <a:rPr lang="en-US" altLang="ko-KR" sz="2000" dirty="0"/>
-              <a:t>)</a:t>
-            </a:r>
           </a:p>
         </p:txBody>
       </p:sp>
     </p:spTree>
     <p:extLst>
       <p:ext uri="{BB962C8B-B14F-4D97-AF65-F5344CB8AC3E}">
-        <p14:creationId xmlns:p14="http://schemas.microsoft.com/office/powerpoint/2010/main" val="65155978"/>
+        <p14:creationId xmlns:p14="http://schemas.microsoft.com/office/powerpoint/2010/main" val="407826983"/>
       </p:ext>
     </p:extLst>
   </p:cSld>
@@ -19988,7 +19869,7 @@
           <a:p>
             <a:r>
               <a:rPr lang="en-US" altLang="ko-KR" dirty="0" err="1"/>
-              <a:t>PlantIn</a:t>
+              <a:t>Plantnote</a:t>
             </a:r>
             <a:endParaRPr lang="ko-KR" altLang="en-US" dirty="0"/>
           </a:p>
@@ -20019,6 +19900,466 @@
           <a:p>
             <a:r>
               <a:rPr lang="ko-KR" altLang="en-US" sz="2000" dirty="0"/>
+              <a:t>구글 렌즈</a:t>
+            </a:r>
+            <a:r>
+              <a:rPr lang="en-US" altLang="ko-KR" sz="2000" dirty="0"/>
+              <a:t>’</a:t>
+            </a:r>
+            <a:r>
+              <a:rPr lang="ko-KR" altLang="en-US" sz="2000" dirty="0"/>
+              <a:t>로 식물 품종 확인하는 탭이 있음</a:t>
+            </a:r>
+            <a:endParaRPr lang="en-US" altLang="ko-KR" sz="2000" dirty="0"/>
+          </a:p>
+          <a:p>
+            <a:r>
+              <a:rPr lang="ko-KR" altLang="en-US" sz="2000" dirty="0"/>
+              <a:t>다만 식물등록은 품종 리스트에서 직접 선택 </a:t>
+            </a:r>
+            <a:r>
+              <a:rPr lang="en-US" altLang="ko-KR" sz="2000" dirty="0"/>
+              <a:t>( </a:t>
+            </a:r>
+            <a:r>
+              <a:rPr lang="ko-KR" altLang="en-US" sz="2000" dirty="0"/>
+              <a:t>분류모델 </a:t>
+            </a:r>
+            <a:r>
+              <a:rPr lang="ko-KR" altLang="en-US" sz="2000" dirty="0" err="1"/>
+              <a:t>쓰지않음</a:t>
+            </a:r>
+            <a:r>
+              <a:rPr lang="en-US" altLang="ko-KR" sz="2000" dirty="0"/>
+              <a:t>)</a:t>
+            </a:r>
+          </a:p>
+          <a:p>
+            <a:pPr lvl="1"/>
+            <a:r>
+              <a:rPr lang="ko-KR" altLang="en-US" sz="1600" dirty="0"/>
+              <a:t>식물 품종별이 아닌 과 별로 분류됨 </a:t>
+            </a:r>
+            <a:r>
+              <a:rPr lang="en-US" altLang="ko-KR" sz="1600" dirty="0"/>
+              <a:t>( </a:t>
+            </a:r>
+            <a:r>
+              <a:rPr lang="ko-KR" altLang="en-US" sz="1600" dirty="0"/>
+              <a:t>사용자가 추가가능 </a:t>
+            </a:r>
+            <a:r>
+              <a:rPr lang="en-US" altLang="ko-KR" sz="1600" dirty="0"/>
+              <a:t>)</a:t>
+            </a:r>
+          </a:p>
+          <a:p>
+            <a:r>
+              <a:rPr lang="ko-KR" altLang="en-US" sz="2000" dirty="0"/>
+              <a:t>식물정보 </a:t>
+            </a:r>
+            <a:r>
+              <a:rPr lang="en-US" altLang="ko-KR" sz="2000" dirty="0"/>
+              <a:t>( </a:t>
+            </a:r>
+            <a:r>
+              <a:rPr lang="ko-KR" altLang="en-US" sz="2000" dirty="0"/>
+              <a:t>전부 사용자가 직접 등록 </a:t>
+            </a:r>
+            <a:r>
+              <a:rPr lang="en-US" altLang="ko-KR" sz="2000" dirty="0"/>
+              <a:t>)</a:t>
+            </a:r>
+          </a:p>
+          <a:p>
+            <a:pPr lvl="1"/>
+            <a:r>
+              <a:rPr lang="ko-KR" altLang="en-US" sz="1600" dirty="0"/>
+              <a:t>식물 사진</a:t>
+            </a:r>
+            <a:endParaRPr lang="en-US" altLang="ko-KR" sz="1600" dirty="0"/>
+          </a:p>
+          <a:p>
+            <a:pPr lvl="1"/>
+            <a:r>
+              <a:rPr lang="ko-KR" altLang="en-US" sz="1600" dirty="0" err="1"/>
+              <a:t>마지막으로물준날</a:t>
+            </a:r>
+            <a:r>
+              <a:rPr lang="en-US" altLang="ko-KR" sz="1600" dirty="0"/>
+              <a:t>, </a:t>
+            </a:r>
+            <a:r>
+              <a:rPr lang="ko-KR" altLang="en-US" sz="1600" dirty="0"/>
+              <a:t>물주기</a:t>
+            </a:r>
+            <a:endParaRPr lang="en-US" altLang="ko-KR" sz="1600" dirty="0"/>
+          </a:p>
+          <a:p>
+            <a:r>
+              <a:rPr lang="ko-KR" altLang="en-US" sz="2000" dirty="0"/>
+              <a:t>근처 식물가게 찾기</a:t>
+            </a:r>
+            <a:endParaRPr lang="en-US" altLang="ko-KR" sz="2000" dirty="0"/>
+          </a:p>
+          <a:p>
+            <a:r>
+              <a:rPr lang="ko-KR" altLang="en-US" sz="2000" dirty="0"/>
+              <a:t>최근 식물 관련 기사 찾기</a:t>
+            </a:r>
+            <a:endParaRPr lang="en-US" altLang="ko-KR" sz="2000" dirty="0"/>
+          </a:p>
+        </p:txBody>
+      </p:sp>
+    </p:spTree>
+    <p:extLst>
+      <p:ext uri="{BB962C8B-B14F-4D97-AF65-F5344CB8AC3E}">
+        <p14:creationId xmlns:p14="http://schemas.microsoft.com/office/powerpoint/2010/main" val="876764507"/>
+      </p:ext>
+    </p:extLst>
+  </p:cSld>
+  <p:clrMapOvr>
+    <a:masterClrMapping/>
+  </p:clrMapOvr>
+</p:sld>
+</file>
+
+<file path=ppt/slides/slide13.xml><?xml version="1.0" encoding="utf-8"?>
+<p:sld xmlns:a="http://schemas.openxmlformats.org/drawingml/2006/main" xmlns:r="http://schemas.openxmlformats.org/officeDocument/2006/relationships" xmlns:p="http://schemas.openxmlformats.org/presentationml/2006/main">
+  <p:cSld>
+    <p:spTree>
+      <p:nvGrpSpPr>
+        <p:cNvPr id="1" name=""/>
+        <p:cNvGrpSpPr/>
+        <p:nvPr/>
+      </p:nvGrpSpPr>
+      <p:grpSpPr>
+        <a:xfrm>
+          <a:off x="0" y="0"/>
+          <a:ext cx="0" cy="0"/>
+          <a:chOff x="0" y="0"/>
+          <a:chExt cx="0" cy="0"/>
+        </a:xfrm>
+      </p:grpSpPr>
+      <p:sp>
+        <p:nvSpPr>
+          <p:cNvPr id="2" name="제목 1">
+            <a:extLst>
+              <a:ext uri="{FF2B5EF4-FFF2-40B4-BE49-F238E27FC236}">
+                <a16:creationId xmlns:a16="http://schemas.microsoft.com/office/drawing/2014/main" id="{11687D24-70FC-655B-1EC8-3A87D0F3E3E3}"/>
+              </a:ext>
+            </a:extLst>
+          </p:cNvPr>
+          <p:cNvSpPr>
+            <a:spLocks noGrp="1"/>
+          </p:cNvSpPr>
+          <p:nvPr>
+            <p:ph type="title"/>
+          </p:nvPr>
+        </p:nvSpPr>
+        <p:spPr/>
+        <p:txBody>
+          <a:bodyPr/>
+          <a:lstStyle/>
+          <a:p>
+            <a:r>
+              <a:rPr lang="ko-KR" altLang="en-US" dirty="0" err="1"/>
+              <a:t>그로우</a:t>
+            </a:r>
+            <a:endParaRPr lang="ko-KR" altLang="en-US" dirty="0"/>
+          </a:p>
+        </p:txBody>
+      </p:sp>
+      <p:sp>
+        <p:nvSpPr>
+          <p:cNvPr id="3" name="내용 개체 틀 2">
+            <a:extLst>
+              <a:ext uri="{FF2B5EF4-FFF2-40B4-BE49-F238E27FC236}">
+                <a16:creationId xmlns:a16="http://schemas.microsoft.com/office/drawing/2014/main" id="{61430AE8-CBB1-EB9F-1616-181F87A1182A}"/>
+              </a:ext>
+            </a:extLst>
+          </p:cNvPr>
+          <p:cNvSpPr>
+            <a:spLocks noGrp="1"/>
+          </p:cNvSpPr>
+          <p:nvPr>
+            <p:ph idx="1"/>
+          </p:nvPr>
+        </p:nvSpPr>
+        <p:spPr>
+          <a:xfrm>
+            <a:off x="495300" y="1600201"/>
+            <a:ext cx="8915400" cy="4525963"/>
+          </a:xfrm>
+        </p:spPr>
+        <p:txBody>
+          <a:bodyPr>
+            <a:normAutofit/>
+          </a:bodyPr>
+          <a:lstStyle/>
+          <a:p>
+            <a:r>
+              <a:rPr lang="ko-KR" altLang="en-US" sz="2000" dirty="0"/>
+              <a:t>전화번호로 로그인</a:t>
+            </a:r>
+            <a:endParaRPr lang="en-US" altLang="ko-KR" sz="2000" dirty="0"/>
+          </a:p>
+          <a:p>
+            <a:r>
+              <a:rPr lang="ko-KR" altLang="en-US" sz="2000" dirty="0"/>
+              <a:t>사진으로 식물 분류는 향후 추가 예정인 듯</a:t>
+            </a:r>
+            <a:endParaRPr lang="en-US" altLang="ko-KR" sz="2000" dirty="0"/>
+          </a:p>
+          <a:p>
+            <a:r>
+              <a:rPr lang="ko-KR" altLang="en-US" sz="2000" dirty="0"/>
+              <a:t>식물등록은 품종 리스트에서 직접 선택</a:t>
+            </a:r>
+            <a:endParaRPr lang="en-US" altLang="ko-KR" sz="1200" dirty="0"/>
+          </a:p>
+          <a:p>
+            <a:pPr lvl="1"/>
+            <a:r>
+              <a:rPr lang="ko-KR" altLang="en-US" sz="1600" dirty="0"/>
+              <a:t>많이 등록한 인기 품종순서로 보여줌</a:t>
+            </a:r>
+            <a:endParaRPr lang="en-US" altLang="ko-KR" sz="1600" dirty="0"/>
+          </a:p>
+          <a:p>
+            <a:r>
+              <a:rPr lang="ko-KR" altLang="en-US" sz="2000" dirty="0"/>
+              <a:t>식물정보 </a:t>
+            </a:r>
+            <a:r>
+              <a:rPr lang="en-US" altLang="ko-KR" sz="2000" dirty="0"/>
+              <a:t>( </a:t>
+            </a:r>
+            <a:r>
+              <a:rPr lang="ko-KR" altLang="en-US" sz="2000" dirty="0"/>
+              <a:t>회사내에 식물정보 데이터베이스가 있는듯 </a:t>
+            </a:r>
+            <a:r>
+              <a:rPr lang="en-US" altLang="ko-KR" sz="2000" dirty="0"/>
+              <a:t>)</a:t>
+            </a:r>
+          </a:p>
+          <a:p>
+            <a:pPr lvl="1"/>
+            <a:r>
+              <a:rPr lang="ko-KR" altLang="en-US" sz="1600" dirty="0"/>
+              <a:t>조도</a:t>
+            </a:r>
+            <a:r>
+              <a:rPr lang="en-US" altLang="ko-KR" sz="1600" dirty="0"/>
+              <a:t>,</a:t>
+            </a:r>
+            <a:r>
+              <a:rPr lang="ko-KR" altLang="en-US" sz="1600" dirty="0"/>
+              <a:t>온도</a:t>
+            </a:r>
+            <a:r>
+              <a:rPr lang="en-US" altLang="ko-KR" sz="1600" dirty="0"/>
+              <a:t>,</a:t>
+            </a:r>
+            <a:r>
+              <a:rPr lang="ko-KR" altLang="en-US" sz="1600" dirty="0"/>
+              <a:t>습도</a:t>
+            </a:r>
+            <a:r>
+              <a:rPr lang="en-US" altLang="ko-KR" sz="1600" dirty="0"/>
+              <a:t>,</a:t>
+            </a:r>
+            <a:r>
+              <a:rPr lang="ko-KR" altLang="en-US" sz="1600" dirty="0"/>
+              <a:t>날씨</a:t>
+            </a:r>
+            <a:r>
+              <a:rPr lang="en-US" altLang="ko-KR" sz="1600" dirty="0"/>
+              <a:t>,</a:t>
+            </a:r>
+            <a:r>
+              <a:rPr lang="ko-KR" altLang="en-US" sz="1600" dirty="0"/>
+              <a:t>환기</a:t>
+            </a:r>
+            <a:r>
+              <a:rPr lang="en-US" altLang="ko-KR" sz="1600" dirty="0"/>
+              <a:t>,</a:t>
+            </a:r>
+            <a:r>
+              <a:rPr lang="ko-KR" altLang="en-US" sz="1600" dirty="0"/>
+              <a:t>가지치기 주기 및 정도</a:t>
+            </a:r>
+            <a:endParaRPr lang="en-US" altLang="ko-KR" sz="1600" dirty="0"/>
+          </a:p>
+          <a:p>
+            <a:pPr lvl="1"/>
+            <a:r>
+              <a:rPr lang="ko-KR" altLang="en-US" sz="1600" dirty="0" err="1"/>
+              <a:t>식물키울</a:t>
+            </a:r>
+            <a:r>
+              <a:rPr lang="ko-KR" altLang="en-US" sz="1600" dirty="0"/>
+              <a:t> 환경을 설문한 후 알맞은 관리정보 자동 세팅 </a:t>
+            </a:r>
+            <a:endParaRPr lang="en-US" altLang="ko-KR" sz="1600" dirty="0"/>
+          </a:p>
+          <a:p>
+            <a:pPr marL="457200" lvl="1" indent="0">
+              <a:buNone/>
+            </a:pPr>
+            <a:r>
+              <a:rPr lang="en-US" altLang="ko-KR" sz="1600" dirty="0"/>
+              <a:t>( </a:t>
+            </a:r>
+            <a:r>
+              <a:rPr lang="ko-KR" altLang="en-US" sz="1600" dirty="0"/>
+              <a:t>마찬가지로 회사 데이터베이스 있는듯</a:t>
+            </a:r>
+            <a:r>
+              <a:rPr lang="en-US" altLang="ko-KR" sz="1600" dirty="0"/>
+              <a:t>)</a:t>
+            </a:r>
+          </a:p>
+          <a:p>
+            <a:pPr lvl="1"/>
+            <a:r>
+              <a:rPr lang="ko-KR" altLang="en-US" sz="1600" dirty="0" err="1"/>
+              <a:t>식물별</a:t>
+            </a:r>
+            <a:r>
+              <a:rPr lang="ko-KR" altLang="en-US" sz="1600" dirty="0"/>
+              <a:t> 주의사항</a:t>
+            </a:r>
+            <a:endParaRPr lang="en-US" altLang="ko-KR" sz="1600" dirty="0"/>
+          </a:p>
+          <a:p>
+            <a:pPr lvl="1"/>
+            <a:r>
+              <a:rPr lang="ko-KR" altLang="en-US" sz="1600" dirty="0" err="1"/>
+              <a:t>식물별</a:t>
+            </a:r>
+            <a:r>
+              <a:rPr lang="ko-KR" altLang="en-US" sz="1600" dirty="0"/>
+              <a:t> 오픈채팅 링크</a:t>
+            </a:r>
+            <a:endParaRPr lang="en-US" altLang="ko-KR" sz="1600" dirty="0"/>
+          </a:p>
+          <a:p>
+            <a:r>
+              <a:rPr lang="ko-KR" altLang="en-US" sz="2000" dirty="0"/>
+              <a:t>친구와 채팅 및 오픈채팅 기능</a:t>
+            </a:r>
+            <a:endParaRPr lang="en-US" altLang="ko-KR" sz="2000" dirty="0"/>
+          </a:p>
+          <a:p>
+            <a:r>
+              <a:rPr lang="en-US" altLang="ko-KR" sz="2000" dirty="0"/>
+              <a:t>AI</a:t>
+            </a:r>
+            <a:r>
+              <a:rPr lang="ko-KR" altLang="en-US" sz="2000" dirty="0"/>
+              <a:t>를 통한 식물 상태 진단 기능 </a:t>
+            </a:r>
+            <a:r>
+              <a:rPr lang="en-US" altLang="ko-KR" sz="2000" dirty="0"/>
+              <a:t>( </a:t>
+            </a:r>
+            <a:r>
+              <a:rPr lang="ko-KR" altLang="en-US" sz="2000" dirty="0"/>
+              <a:t>잘 안됨 </a:t>
+            </a:r>
+            <a:r>
+              <a:rPr lang="en-US" altLang="ko-KR" sz="2000" dirty="0"/>
+              <a:t>)</a:t>
+            </a:r>
+          </a:p>
+        </p:txBody>
+      </p:sp>
+    </p:spTree>
+    <p:extLst>
+      <p:ext uri="{BB962C8B-B14F-4D97-AF65-F5344CB8AC3E}">
+        <p14:creationId xmlns:p14="http://schemas.microsoft.com/office/powerpoint/2010/main" val="65155978"/>
+      </p:ext>
+    </p:extLst>
+  </p:cSld>
+  <p:clrMapOvr>
+    <a:masterClrMapping/>
+  </p:clrMapOvr>
+</p:sld>
+</file>
+
+<file path=ppt/slides/slide14.xml><?xml version="1.0" encoding="utf-8"?>
+<p:sld xmlns:a="http://schemas.openxmlformats.org/drawingml/2006/main" xmlns:r="http://schemas.openxmlformats.org/officeDocument/2006/relationships" xmlns:p="http://schemas.openxmlformats.org/presentationml/2006/main">
+  <p:cSld>
+    <p:spTree>
+      <p:nvGrpSpPr>
+        <p:cNvPr id="1" name=""/>
+        <p:cNvGrpSpPr/>
+        <p:nvPr/>
+      </p:nvGrpSpPr>
+      <p:grpSpPr>
+        <a:xfrm>
+          <a:off x="0" y="0"/>
+          <a:ext cx="0" cy="0"/>
+          <a:chOff x="0" y="0"/>
+          <a:chExt cx="0" cy="0"/>
+        </a:xfrm>
+      </p:grpSpPr>
+      <p:sp>
+        <p:nvSpPr>
+          <p:cNvPr id="2" name="제목 1">
+            <a:extLst>
+              <a:ext uri="{FF2B5EF4-FFF2-40B4-BE49-F238E27FC236}">
+                <a16:creationId xmlns:a16="http://schemas.microsoft.com/office/drawing/2014/main" id="{11687D24-70FC-655B-1EC8-3A87D0F3E3E3}"/>
+              </a:ext>
+            </a:extLst>
+          </p:cNvPr>
+          <p:cNvSpPr>
+            <a:spLocks noGrp="1"/>
+          </p:cNvSpPr>
+          <p:nvPr>
+            <p:ph type="title"/>
+          </p:nvPr>
+        </p:nvSpPr>
+        <p:spPr/>
+        <p:txBody>
+          <a:bodyPr/>
+          <a:lstStyle/>
+          <a:p>
+            <a:r>
+              <a:rPr lang="en-US" altLang="ko-KR" dirty="0" err="1"/>
+              <a:t>PlantIn</a:t>
+            </a:r>
+            <a:endParaRPr lang="ko-KR" altLang="en-US" dirty="0"/>
+          </a:p>
+        </p:txBody>
+      </p:sp>
+      <p:sp>
+        <p:nvSpPr>
+          <p:cNvPr id="3" name="내용 개체 틀 2">
+            <a:extLst>
+              <a:ext uri="{FF2B5EF4-FFF2-40B4-BE49-F238E27FC236}">
+                <a16:creationId xmlns:a16="http://schemas.microsoft.com/office/drawing/2014/main" id="{61430AE8-CBB1-EB9F-1616-181F87A1182A}"/>
+              </a:ext>
+            </a:extLst>
+          </p:cNvPr>
+          <p:cNvSpPr>
+            <a:spLocks noGrp="1"/>
+          </p:cNvSpPr>
+          <p:nvPr>
+            <p:ph idx="1"/>
+          </p:nvPr>
+        </p:nvSpPr>
+        <p:spPr/>
+        <p:txBody>
+          <a:bodyPr>
+            <a:normAutofit/>
+          </a:bodyPr>
+          <a:lstStyle/>
+          <a:p>
+            <a:r>
+              <a:rPr lang="ko-KR" altLang="en-US" sz="2000" dirty="0"/>
               <a:t>이메일 계정 생성 후 로그인</a:t>
             </a:r>
             <a:endParaRPr lang="en-US" altLang="ko-KR" sz="2000" dirty="0"/>
@@ -20075,7 +20416,7 @@
 </p:sld>
 </file>
 
-<file path=ppt/slides/slide13.xml><?xml version="1.0" encoding="utf-8"?>
+<file path=ppt/slides/slide15.xml><?xml version="1.0" encoding="utf-8"?>
 <p:sld xmlns:a="http://schemas.openxmlformats.org/drawingml/2006/main" xmlns:r="http://schemas.openxmlformats.org/officeDocument/2006/relationships" xmlns:p="http://schemas.openxmlformats.org/presentationml/2006/main">
   <p:cSld>
     <p:spTree>
@@ -20222,6 +20563,596 @@
     <p:extLst>
       <p:ext uri="{BB962C8B-B14F-4D97-AF65-F5344CB8AC3E}">
         <p14:creationId xmlns:p14="http://schemas.microsoft.com/office/powerpoint/2010/main" val="676371734"/>
+      </p:ext>
+    </p:extLst>
+  </p:cSld>
+  <p:clrMapOvr>
+    <a:masterClrMapping/>
+  </p:clrMapOvr>
+</p:sld>
+</file>
+
+<file path=ppt/slides/slide16.xml><?xml version="1.0" encoding="utf-8"?>
+<p:sld xmlns:a="http://schemas.openxmlformats.org/drawingml/2006/main" xmlns:r="http://schemas.openxmlformats.org/officeDocument/2006/relationships" xmlns:p="http://schemas.openxmlformats.org/presentationml/2006/main">
+  <p:cSld>
+    <p:spTree>
+      <p:nvGrpSpPr>
+        <p:cNvPr id="1" name=""/>
+        <p:cNvGrpSpPr/>
+        <p:nvPr/>
+      </p:nvGrpSpPr>
+      <p:grpSpPr>
+        <a:xfrm>
+          <a:off x="0" y="0"/>
+          <a:ext cx="0" cy="0"/>
+          <a:chOff x="0" y="0"/>
+          <a:chExt cx="0" cy="0"/>
+        </a:xfrm>
+      </p:grpSpPr>
+      <p:sp>
+        <p:nvSpPr>
+          <p:cNvPr id="2" name="제목 1">
+            <a:extLst>
+              <a:ext uri="{FF2B5EF4-FFF2-40B4-BE49-F238E27FC236}">
+                <a16:creationId xmlns:a16="http://schemas.microsoft.com/office/drawing/2014/main" id="{6AC11C22-35BC-BD22-E401-3290DB553938}"/>
+              </a:ext>
+            </a:extLst>
+          </p:cNvPr>
+          <p:cNvSpPr>
+            <a:spLocks noGrp="1"/>
+          </p:cNvSpPr>
+          <p:nvPr>
+            <p:ph type="title"/>
+          </p:nvPr>
+        </p:nvSpPr>
+        <p:spPr/>
+        <p:txBody>
+          <a:bodyPr/>
+          <a:lstStyle/>
+          <a:p>
+            <a:r>
+              <a:rPr lang="ko-KR" altLang="en-US" dirty="0"/>
+              <a:t>식물 분류기</a:t>
+            </a:r>
+          </a:p>
+        </p:txBody>
+      </p:sp>
+    </p:spTree>
+    <p:extLst>
+      <p:ext uri="{BB962C8B-B14F-4D97-AF65-F5344CB8AC3E}">
+        <p14:creationId xmlns:p14="http://schemas.microsoft.com/office/powerpoint/2010/main" val="3844158730"/>
+      </p:ext>
+    </p:extLst>
+  </p:cSld>
+  <p:clrMapOvr>
+    <a:masterClrMapping/>
+  </p:clrMapOvr>
+</p:sld>
+</file>
+
+<file path=ppt/slides/slide17.xml><?xml version="1.0" encoding="utf-8"?>
+<p:sld xmlns:a="http://schemas.openxmlformats.org/drawingml/2006/main" xmlns:r="http://schemas.openxmlformats.org/officeDocument/2006/relationships" xmlns:p="http://schemas.openxmlformats.org/presentationml/2006/main">
+  <p:cSld>
+    <p:spTree>
+      <p:nvGrpSpPr>
+        <p:cNvPr id="1" name=""/>
+        <p:cNvGrpSpPr/>
+        <p:nvPr/>
+      </p:nvGrpSpPr>
+      <p:grpSpPr>
+        <a:xfrm>
+          <a:off x="0" y="0"/>
+          <a:ext cx="0" cy="0"/>
+          <a:chOff x="0" y="0"/>
+          <a:chExt cx="0" cy="0"/>
+        </a:xfrm>
+      </p:grpSpPr>
+      <p:sp>
+        <p:nvSpPr>
+          <p:cNvPr id="2" name="제목 1">
+            <a:extLst>
+              <a:ext uri="{FF2B5EF4-FFF2-40B4-BE49-F238E27FC236}">
+                <a16:creationId xmlns:a16="http://schemas.microsoft.com/office/drawing/2014/main" id="{2D75BAAB-C5A6-C791-4DBE-11D46B5011DC}"/>
+              </a:ext>
+            </a:extLst>
+          </p:cNvPr>
+          <p:cNvSpPr>
+            <a:spLocks noGrp="1"/>
+          </p:cNvSpPr>
+          <p:nvPr>
+            <p:ph type="title"/>
+          </p:nvPr>
+        </p:nvSpPr>
+        <p:spPr/>
+        <p:txBody>
+          <a:bodyPr/>
+          <a:lstStyle/>
+          <a:p>
+            <a:r>
+              <a:rPr lang="en-US" altLang="ko-KR" dirty="0"/>
+              <a:t>Plant.id</a:t>
+            </a:r>
+            <a:endParaRPr lang="ko-KR" altLang="en-US" dirty="0"/>
+          </a:p>
+        </p:txBody>
+      </p:sp>
+      <p:sp>
+        <p:nvSpPr>
+          <p:cNvPr id="3" name="내용 개체 틀 2">
+            <a:extLst>
+              <a:ext uri="{FF2B5EF4-FFF2-40B4-BE49-F238E27FC236}">
+                <a16:creationId xmlns:a16="http://schemas.microsoft.com/office/drawing/2014/main" id="{AB0967F0-52A8-6AA0-190A-3B9BA0616F0A}"/>
+              </a:ext>
+            </a:extLst>
+          </p:cNvPr>
+          <p:cNvSpPr>
+            <a:spLocks noGrp="1"/>
+          </p:cNvSpPr>
+          <p:nvPr>
+            <p:ph idx="1"/>
+          </p:nvPr>
+        </p:nvSpPr>
+        <p:spPr/>
+        <p:txBody>
+          <a:bodyPr>
+            <a:normAutofit fontScale="85000" lnSpcReduction="20000"/>
+          </a:bodyPr>
+          <a:lstStyle/>
+          <a:p>
+            <a:r>
+              <a:rPr lang="en-US" altLang="ko-KR" dirty="0">
+                <a:hlinkClick r:id="rId2"/>
+              </a:rPr>
+              <a:t>https://web.plant.id/plant-identification-api/</a:t>
+            </a:r>
+            <a:endParaRPr lang="en-US" altLang="ko-KR" dirty="0"/>
+          </a:p>
+          <a:p>
+            <a:r>
+              <a:rPr lang="ko-KR" altLang="en-US" dirty="0"/>
+              <a:t>식물관리 프로그램 및 제품 제작 회사</a:t>
+            </a:r>
+            <a:endParaRPr lang="en-US" altLang="ko-KR" dirty="0"/>
+          </a:p>
+          <a:p>
+            <a:r>
+              <a:rPr lang="ko-KR" altLang="en-US" dirty="0"/>
+              <a:t>자체제작 식물 분류 모델 </a:t>
+            </a:r>
+            <a:r>
+              <a:rPr lang="en-US" altLang="ko-KR" dirty="0" err="1"/>
+              <a:t>api</a:t>
+            </a:r>
+            <a:r>
+              <a:rPr lang="ko-KR" altLang="en-US" dirty="0"/>
+              <a:t>로 제공</a:t>
+            </a:r>
+            <a:endParaRPr lang="en-US" altLang="ko-KR" dirty="0"/>
+          </a:p>
+          <a:p>
+            <a:r>
+              <a:rPr lang="en-US" altLang="ko-KR" dirty="0"/>
+              <a:t>12050</a:t>
+            </a:r>
+            <a:r>
+              <a:rPr lang="ko-KR" altLang="en-US" dirty="0"/>
+              <a:t>종 분류 </a:t>
+            </a:r>
+            <a:r>
+              <a:rPr lang="en-US" altLang="ko-KR" dirty="0"/>
+              <a:t>( accuracy</a:t>
+            </a:r>
+            <a:r>
+              <a:rPr lang="ko-KR" altLang="en-US" dirty="0"/>
+              <a:t> </a:t>
+            </a:r>
+            <a:r>
+              <a:rPr lang="en-US" altLang="ko-KR" dirty="0"/>
+              <a:t>87.2% )</a:t>
+            </a:r>
+          </a:p>
+          <a:p>
+            <a:r>
+              <a:rPr lang="en-US" altLang="ko-KR" dirty="0"/>
+              <a:t>Request </a:t>
+            </a:r>
+            <a:r>
+              <a:rPr lang="ko-KR" altLang="en-US" dirty="0"/>
+              <a:t>이미지</a:t>
+            </a:r>
+            <a:endParaRPr lang="en-US" altLang="ko-KR" dirty="0"/>
+          </a:p>
+          <a:p>
+            <a:pPr marL="0" indent="0">
+              <a:buNone/>
+            </a:pPr>
+            <a:r>
+              <a:rPr lang="en-US" altLang="ko-KR" dirty="0"/>
+              <a:t>-&gt; Response</a:t>
+            </a:r>
+            <a:r>
+              <a:rPr lang="ko-KR" altLang="en-US" dirty="0"/>
+              <a:t> 정확도 </a:t>
+            </a:r>
+            <a:r>
+              <a:rPr lang="ko-KR" altLang="en-US" dirty="0" err="1"/>
+              <a:t>높은순으로</a:t>
+            </a:r>
+            <a:r>
+              <a:rPr lang="ko-KR" altLang="en-US" dirty="0"/>
+              <a:t> 식물 종 리스트</a:t>
+            </a:r>
+            <a:endParaRPr lang="en-US" altLang="ko-KR" dirty="0"/>
+          </a:p>
+          <a:p>
+            <a:r>
+              <a:rPr lang="ko-KR" altLang="en-US" dirty="0"/>
+              <a:t>건당 </a:t>
+            </a:r>
+            <a:r>
+              <a:rPr lang="en-US" altLang="ko-KR" dirty="0"/>
+              <a:t>0.05</a:t>
+            </a:r>
+            <a:r>
+              <a:rPr lang="ko-KR" altLang="en-US" dirty="0"/>
+              <a:t>유로 </a:t>
+            </a:r>
+            <a:r>
+              <a:rPr lang="en-US" altLang="ko-KR" dirty="0"/>
+              <a:t>= 66.90</a:t>
+            </a:r>
+            <a:r>
+              <a:rPr lang="ko-KR" altLang="en-US" dirty="0"/>
+              <a:t>원</a:t>
+            </a:r>
+            <a:r>
+              <a:rPr lang="en-US" altLang="ko-KR" dirty="0"/>
+              <a:t>(</a:t>
+            </a:r>
+            <a:r>
+              <a:rPr lang="ko-KR" altLang="en-US" dirty="0"/>
+              <a:t>확인필요</a:t>
+            </a:r>
+            <a:r>
+              <a:rPr lang="en-US" altLang="ko-KR" dirty="0"/>
+              <a:t>)</a:t>
+            </a:r>
+          </a:p>
+          <a:p>
+            <a:endParaRPr lang="en-US" altLang="ko-KR" dirty="0"/>
+          </a:p>
+          <a:p>
+            <a:pPr marL="0" indent="0">
+              <a:buNone/>
+            </a:pPr>
+            <a:r>
+              <a:rPr lang="en-US" altLang="ko-KR" dirty="0"/>
+              <a:t>+</a:t>
+            </a:r>
+            <a:r>
+              <a:rPr lang="ko-KR" altLang="en-US" dirty="0"/>
+              <a:t>식물 건강체크 기능 제공</a:t>
+            </a:r>
+            <a:endParaRPr lang="en-US" altLang="ko-KR" dirty="0"/>
+          </a:p>
+          <a:p>
+            <a:pPr marL="0" indent="0">
+              <a:buNone/>
+            </a:pPr>
+            <a:r>
+              <a:rPr lang="en-US" altLang="ko-KR" dirty="0"/>
+              <a:t>#</a:t>
+            </a:r>
+            <a:r>
+              <a:rPr lang="ko-KR" altLang="en-US" dirty="0"/>
+              <a:t>자세한 사항은 앱에서 테스트시 확인 </a:t>
+            </a:r>
+            <a:r>
+              <a:rPr lang="ko-KR" altLang="en-US" dirty="0" err="1"/>
+              <a:t>가능할듯</a:t>
+            </a:r>
+            <a:endParaRPr lang="en-US" altLang="ko-KR" dirty="0"/>
+          </a:p>
+        </p:txBody>
+      </p:sp>
+    </p:spTree>
+    <p:extLst>
+      <p:ext uri="{BB962C8B-B14F-4D97-AF65-F5344CB8AC3E}">
+        <p14:creationId xmlns:p14="http://schemas.microsoft.com/office/powerpoint/2010/main" val="1368043656"/>
+      </p:ext>
+    </p:extLst>
+  </p:cSld>
+  <p:clrMapOvr>
+    <a:masterClrMapping/>
+  </p:clrMapOvr>
+</p:sld>
+</file>
+
+<file path=ppt/slides/slide18.xml><?xml version="1.0" encoding="utf-8"?>
+<p:sld xmlns:a="http://schemas.openxmlformats.org/drawingml/2006/main" xmlns:r="http://schemas.openxmlformats.org/officeDocument/2006/relationships" xmlns:p="http://schemas.openxmlformats.org/presentationml/2006/main">
+  <p:cSld>
+    <p:spTree>
+      <p:nvGrpSpPr>
+        <p:cNvPr id="1" name=""/>
+        <p:cNvGrpSpPr/>
+        <p:nvPr/>
+      </p:nvGrpSpPr>
+      <p:grpSpPr>
+        <a:xfrm>
+          <a:off x="0" y="0"/>
+          <a:ext cx="0" cy="0"/>
+          <a:chOff x="0" y="0"/>
+          <a:chExt cx="0" cy="0"/>
+        </a:xfrm>
+      </p:grpSpPr>
+      <p:sp>
+        <p:nvSpPr>
+          <p:cNvPr id="2" name="제목 1">
+            <a:extLst>
+              <a:ext uri="{FF2B5EF4-FFF2-40B4-BE49-F238E27FC236}">
+                <a16:creationId xmlns:a16="http://schemas.microsoft.com/office/drawing/2014/main" id="{2D75BAAB-C5A6-C791-4DBE-11D46B5011DC}"/>
+              </a:ext>
+            </a:extLst>
+          </p:cNvPr>
+          <p:cNvSpPr>
+            <a:spLocks noGrp="1"/>
+          </p:cNvSpPr>
+          <p:nvPr>
+            <p:ph type="title"/>
+          </p:nvPr>
+        </p:nvSpPr>
+        <p:spPr/>
+        <p:txBody>
+          <a:bodyPr/>
+          <a:lstStyle/>
+          <a:p>
+            <a:r>
+              <a:rPr lang="en-US" altLang="ko-KR" dirty="0"/>
+              <a:t>Plant.id</a:t>
+            </a:r>
+            <a:endParaRPr lang="ko-KR" altLang="en-US" dirty="0"/>
+          </a:p>
+        </p:txBody>
+      </p:sp>
+      <p:pic>
+        <p:nvPicPr>
+          <p:cNvPr id="7" name="그림 6">
+            <a:extLst>
+              <a:ext uri="{FF2B5EF4-FFF2-40B4-BE49-F238E27FC236}">
+                <a16:creationId xmlns:a16="http://schemas.microsoft.com/office/drawing/2014/main" id="{4D6C9915-3E91-1ABA-33D3-2BED993E3F90}"/>
+              </a:ext>
+            </a:extLst>
+          </p:cNvPr>
+          <p:cNvPicPr>
+            <a:picLocks noChangeAspect="1"/>
+          </p:cNvPicPr>
+          <p:nvPr/>
+        </p:nvPicPr>
+        <p:blipFill>
+          <a:blip r:embed="rId2"/>
+          <a:stretch>
+            <a:fillRect/>
+          </a:stretch>
+        </p:blipFill>
+        <p:spPr>
+          <a:xfrm>
+            <a:off x="-117955" y="476672"/>
+            <a:ext cx="3219450" cy="3143250"/>
+          </a:xfrm>
+          <a:prstGeom prst="rect">
+            <a:avLst/>
+          </a:prstGeom>
+        </p:spPr>
+      </p:pic>
+      <p:pic>
+        <p:nvPicPr>
+          <p:cNvPr id="9" name="그림 8">
+            <a:extLst>
+              <a:ext uri="{FF2B5EF4-FFF2-40B4-BE49-F238E27FC236}">
+                <a16:creationId xmlns:a16="http://schemas.microsoft.com/office/drawing/2014/main" id="{90A93037-FB73-4146-D85D-57B78366FEBD}"/>
+              </a:ext>
+            </a:extLst>
+          </p:cNvPr>
+          <p:cNvPicPr>
+            <a:picLocks noChangeAspect="1"/>
+          </p:cNvPicPr>
+          <p:nvPr/>
+        </p:nvPicPr>
+        <p:blipFill>
+          <a:blip r:embed="rId3"/>
+          <a:stretch>
+            <a:fillRect/>
+          </a:stretch>
+        </p:blipFill>
+        <p:spPr>
+          <a:xfrm>
+            <a:off x="3078489" y="0"/>
+            <a:ext cx="6849727" cy="6858000"/>
+          </a:xfrm>
+          <a:prstGeom prst="rect">
+            <a:avLst/>
+          </a:prstGeom>
+        </p:spPr>
+      </p:pic>
+      <p:sp>
+        <p:nvSpPr>
+          <p:cNvPr id="6" name="TextBox 5">
+            <a:extLst>
+              <a:ext uri="{FF2B5EF4-FFF2-40B4-BE49-F238E27FC236}">
+                <a16:creationId xmlns:a16="http://schemas.microsoft.com/office/drawing/2014/main" id="{2324EB48-A4EF-7C3D-1E0F-DEE61BD4A271}"/>
+              </a:ext>
+            </a:extLst>
+          </p:cNvPr>
+          <p:cNvSpPr txBox="1"/>
+          <p:nvPr/>
+        </p:nvSpPr>
+        <p:spPr>
+          <a:xfrm>
+            <a:off x="498442" y="3821956"/>
+            <a:ext cx="1800200" cy="369332"/>
+          </a:xfrm>
+          <a:prstGeom prst="rect">
+            <a:avLst/>
+          </a:prstGeom>
+          <a:noFill/>
+        </p:spPr>
+        <p:txBody>
+          <a:bodyPr wrap="square" rtlCol="0">
+            <a:spAutoFit/>
+          </a:bodyPr>
+          <a:lstStyle/>
+          <a:p>
+            <a:r>
+              <a:rPr lang="en-US" altLang="ko-KR" dirty="0"/>
+              <a:t>Test image</a:t>
+            </a:r>
+            <a:endParaRPr lang="ko-KR" altLang="en-US" dirty="0"/>
+          </a:p>
+        </p:txBody>
+      </p:sp>
+    </p:spTree>
+    <p:extLst>
+      <p:ext uri="{BB962C8B-B14F-4D97-AF65-F5344CB8AC3E}">
+        <p14:creationId xmlns:p14="http://schemas.microsoft.com/office/powerpoint/2010/main" val="157857679"/>
+      </p:ext>
+    </p:extLst>
+  </p:cSld>
+  <p:clrMapOvr>
+    <a:masterClrMapping/>
+  </p:clrMapOvr>
+</p:sld>
+</file>
+
+<file path=ppt/slides/slide19.xml><?xml version="1.0" encoding="utf-8"?>
+<p:sld xmlns:a="http://schemas.openxmlformats.org/drawingml/2006/main" xmlns:r="http://schemas.openxmlformats.org/officeDocument/2006/relationships" xmlns:p="http://schemas.openxmlformats.org/presentationml/2006/main">
+  <p:cSld>
+    <p:spTree>
+      <p:nvGrpSpPr>
+        <p:cNvPr id="1" name=""/>
+        <p:cNvGrpSpPr/>
+        <p:nvPr/>
+      </p:nvGrpSpPr>
+      <p:grpSpPr>
+        <a:xfrm>
+          <a:off x="0" y="0"/>
+          <a:ext cx="0" cy="0"/>
+          <a:chOff x="0" y="0"/>
+          <a:chExt cx="0" cy="0"/>
+        </a:xfrm>
+      </p:grpSpPr>
+      <p:sp>
+        <p:nvSpPr>
+          <p:cNvPr id="2" name="제목 1">
+            <a:extLst>
+              <a:ext uri="{FF2B5EF4-FFF2-40B4-BE49-F238E27FC236}">
+                <a16:creationId xmlns:a16="http://schemas.microsoft.com/office/drawing/2014/main" id="{2D75BAAB-C5A6-C791-4DBE-11D46B5011DC}"/>
+              </a:ext>
+            </a:extLst>
+          </p:cNvPr>
+          <p:cNvSpPr>
+            <a:spLocks noGrp="1"/>
+          </p:cNvSpPr>
+          <p:nvPr>
+            <p:ph type="title"/>
+          </p:nvPr>
+        </p:nvSpPr>
+        <p:spPr/>
+        <p:txBody>
+          <a:bodyPr/>
+          <a:lstStyle/>
+          <a:p>
+            <a:r>
+              <a:rPr lang="en-US" altLang="ko-KR" dirty="0"/>
+              <a:t>Google</a:t>
+            </a:r>
+            <a:r>
+              <a:rPr lang="ko-KR" altLang="en-US" dirty="0"/>
+              <a:t> </a:t>
+            </a:r>
+            <a:r>
+              <a:rPr lang="en-US" altLang="ko-KR" dirty="0"/>
+              <a:t>Cloud Vision </a:t>
+            </a:r>
+            <a:r>
+              <a:rPr lang="en-US" altLang="ko-KR" dirty="0" err="1"/>
+              <a:t>api</a:t>
+            </a:r>
+            <a:endParaRPr lang="ko-KR" altLang="en-US" dirty="0"/>
+          </a:p>
+        </p:txBody>
+      </p:sp>
+      <p:sp>
+        <p:nvSpPr>
+          <p:cNvPr id="3" name="내용 개체 틀 2">
+            <a:extLst>
+              <a:ext uri="{FF2B5EF4-FFF2-40B4-BE49-F238E27FC236}">
+                <a16:creationId xmlns:a16="http://schemas.microsoft.com/office/drawing/2014/main" id="{AB0967F0-52A8-6AA0-190A-3B9BA0616F0A}"/>
+              </a:ext>
+            </a:extLst>
+          </p:cNvPr>
+          <p:cNvSpPr>
+            <a:spLocks noGrp="1"/>
+          </p:cNvSpPr>
+          <p:nvPr>
+            <p:ph idx="1"/>
+          </p:nvPr>
+        </p:nvSpPr>
+        <p:spPr/>
+        <p:txBody>
+          <a:bodyPr/>
+          <a:lstStyle/>
+          <a:p>
+            <a:r>
+              <a:rPr lang="ko-KR" altLang="en-US" dirty="0"/>
+              <a:t>분류라벨 중 꽃</a:t>
+            </a:r>
+            <a:r>
+              <a:rPr lang="en-US" altLang="ko-KR" dirty="0"/>
+              <a:t>,</a:t>
+            </a:r>
+            <a:r>
+              <a:rPr lang="ko-KR" altLang="en-US" dirty="0"/>
+              <a:t>식물이 있긴 하지만 무슨 꽃인지 까지 구별해주는 기능은 </a:t>
+            </a:r>
+            <a:r>
+              <a:rPr lang="en-US" altLang="ko-KR" dirty="0"/>
+              <a:t>google</a:t>
+            </a:r>
+            <a:r>
+              <a:rPr lang="ko-KR" altLang="en-US" dirty="0"/>
+              <a:t> </a:t>
+            </a:r>
+            <a:r>
+              <a:rPr lang="en-US" altLang="ko-KR" dirty="0" err="1"/>
+              <a:t>apk,web</a:t>
+            </a:r>
+            <a:r>
+              <a:rPr lang="ko-KR" altLang="en-US" dirty="0"/>
+              <a:t>에서만 작동</a:t>
+            </a:r>
+            <a:endParaRPr lang="en-US" altLang="ko-KR" dirty="0"/>
+          </a:p>
+          <a:p>
+            <a:r>
+              <a:rPr lang="ko-KR" altLang="en-US" dirty="0"/>
+              <a:t>유료결제로 사용하더라도 식물분류까지는 불가능 </a:t>
+            </a:r>
+            <a:r>
+              <a:rPr lang="ko-KR" altLang="en-US" dirty="0" err="1"/>
+              <a:t>한듯</a:t>
+            </a:r>
+            <a:r>
+              <a:rPr lang="ko-KR" altLang="en-US" dirty="0"/>
+              <a:t> 보임</a:t>
+            </a:r>
+            <a:endParaRPr lang="en-US" altLang="ko-KR" dirty="0"/>
+          </a:p>
+        </p:txBody>
+      </p:sp>
+    </p:spTree>
+    <p:extLst>
+      <p:ext uri="{BB962C8B-B14F-4D97-AF65-F5344CB8AC3E}">
+        <p14:creationId xmlns:p14="http://schemas.microsoft.com/office/powerpoint/2010/main" val="3596873654"/>
       </p:ext>
     </p:extLst>
   </p:cSld>
@@ -20281,6 +21212,276 @@
     <p:extLst>
       <p:ext uri="{BB962C8B-B14F-4D97-AF65-F5344CB8AC3E}">
         <p14:creationId xmlns:p14="http://schemas.microsoft.com/office/powerpoint/2010/main" val="3471249809"/>
+      </p:ext>
+    </p:extLst>
+  </p:cSld>
+  <p:clrMapOvr>
+    <a:masterClrMapping/>
+  </p:clrMapOvr>
+</p:sld>
+</file>
+
+<file path=ppt/slides/slide20.xml><?xml version="1.0" encoding="utf-8"?>
+<p:sld xmlns:a="http://schemas.openxmlformats.org/drawingml/2006/main" xmlns:r="http://schemas.openxmlformats.org/officeDocument/2006/relationships" xmlns:p="http://schemas.openxmlformats.org/presentationml/2006/main">
+  <p:cSld>
+    <p:spTree>
+      <p:nvGrpSpPr>
+        <p:cNvPr id="1" name=""/>
+        <p:cNvGrpSpPr/>
+        <p:nvPr/>
+      </p:nvGrpSpPr>
+      <p:grpSpPr>
+        <a:xfrm>
+          <a:off x="0" y="0"/>
+          <a:ext cx="0" cy="0"/>
+          <a:chOff x="0" y="0"/>
+          <a:chExt cx="0" cy="0"/>
+        </a:xfrm>
+      </p:grpSpPr>
+      <p:sp>
+        <p:nvSpPr>
+          <p:cNvPr id="2" name="제목 1">
+            <a:extLst>
+              <a:ext uri="{FF2B5EF4-FFF2-40B4-BE49-F238E27FC236}">
+                <a16:creationId xmlns:a16="http://schemas.microsoft.com/office/drawing/2014/main" id="{6AC11C22-35BC-BD22-E401-3290DB553938}"/>
+              </a:ext>
+            </a:extLst>
+          </p:cNvPr>
+          <p:cNvSpPr>
+            <a:spLocks noGrp="1"/>
+          </p:cNvSpPr>
+          <p:nvPr>
+            <p:ph type="title"/>
+          </p:nvPr>
+        </p:nvSpPr>
+        <p:spPr/>
+        <p:txBody>
+          <a:bodyPr/>
+          <a:lstStyle/>
+          <a:p>
+            <a:r>
+              <a:rPr lang="ko-KR" altLang="en-US" dirty="0"/>
+              <a:t>식물 상세정보 </a:t>
+            </a:r>
+            <a:r>
+              <a:rPr lang="en-US" altLang="ko-KR" dirty="0"/>
+              <a:t>19~page</a:t>
+            </a:r>
+            <a:endParaRPr lang="ko-KR" altLang="en-US" dirty="0"/>
+          </a:p>
+        </p:txBody>
+      </p:sp>
+    </p:spTree>
+    <p:extLst>
+      <p:ext uri="{BB962C8B-B14F-4D97-AF65-F5344CB8AC3E}">
+        <p14:creationId xmlns:p14="http://schemas.microsoft.com/office/powerpoint/2010/main" val="2963987455"/>
+      </p:ext>
+    </p:extLst>
+  </p:cSld>
+  <p:clrMapOvr>
+    <a:masterClrMapping/>
+  </p:clrMapOvr>
+</p:sld>
+</file>
+
+<file path=ppt/slides/slide21.xml><?xml version="1.0" encoding="utf-8"?>
+<p:sld xmlns:a="http://schemas.openxmlformats.org/drawingml/2006/main" xmlns:r="http://schemas.openxmlformats.org/officeDocument/2006/relationships" xmlns:p="http://schemas.openxmlformats.org/presentationml/2006/main">
+  <p:cSld>
+    <p:spTree>
+      <p:nvGrpSpPr>
+        <p:cNvPr id="1" name=""/>
+        <p:cNvGrpSpPr/>
+        <p:nvPr/>
+      </p:nvGrpSpPr>
+      <p:grpSpPr>
+        <a:xfrm>
+          <a:off x="0" y="0"/>
+          <a:ext cx="0" cy="0"/>
+          <a:chOff x="0" y="0"/>
+          <a:chExt cx="0" cy="0"/>
+        </a:xfrm>
+      </p:grpSpPr>
+      <p:sp>
+        <p:nvSpPr>
+          <p:cNvPr id="2" name="제목 1">
+            <a:extLst>
+              <a:ext uri="{FF2B5EF4-FFF2-40B4-BE49-F238E27FC236}">
+                <a16:creationId xmlns:a16="http://schemas.microsoft.com/office/drawing/2014/main" id="{86AF09A7-780A-BAD1-4396-1A3BDE39840F}"/>
+              </a:ext>
+            </a:extLst>
+          </p:cNvPr>
+          <p:cNvSpPr>
+            <a:spLocks noGrp="1"/>
+          </p:cNvSpPr>
+          <p:nvPr>
+            <p:ph type="title"/>
+          </p:nvPr>
+        </p:nvSpPr>
+        <p:spPr/>
+        <p:txBody>
+          <a:bodyPr/>
+          <a:lstStyle/>
+          <a:p>
+            <a:r>
+              <a:rPr lang="ko-KR" altLang="en-US" dirty="0"/>
+              <a:t>산림청</a:t>
+            </a:r>
+            <a:r>
+              <a:rPr lang="en-US" altLang="ko-KR" dirty="0"/>
+              <a:t>(</a:t>
+            </a:r>
+            <a:r>
+              <a:rPr lang="ko-KR" altLang="en-US" dirty="0" err="1"/>
+              <a:t>숲에사는</a:t>
+            </a:r>
+            <a:r>
+              <a:rPr lang="ko-KR" altLang="en-US" dirty="0"/>
+              <a:t> 식물정보</a:t>
+            </a:r>
+            <a:r>
+              <a:rPr lang="en-US" altLang="ko-KR" dirty="0"/>
+              <a:t>)</a:t>
+            </a:r>
+            <a:endParaRPr lang="ko-KR" altLang="en-US" dirty="0"/>
+          </a:p>
+        </p:txBody>
+      </p:sp>
+      <p:sp>
+        <p:nvSpPr>
+          <p:cNvPr id="3" name="내용 개체 틀 2">
+            <a:extLst>
+              <a:ext uri="{FF2B5EF4-FFF2-40B4-BE49-F238E27FC236}">
+                <a16:creationId xmlns:a16="http://schemas.microsoft.com/office/drawing/2014/main" id="{643D6A9B-2301-037D-85CD-49FC6DFD771B}"/>
+              </a:ext>
+            </a:extLst>
+          </p:cNvPr>
+          <p:cNvSpPr>
+            <a:spLocks noGrp="1"/>
+          </p:cNvSpPr>
+          <p:nvPr>
+            <p:ph idx="1"/>
+          </p:nvPr>
+        </p:nvSpPr>
+        <p:spPr/>
+        <p:txBody>
+          <a:bodyPr>
+            <a:normAutofit/>
+          </a:bodyPr>
+          <a:lstStyle/>
+          <a:p>
+            <a:r>
+              <a:rPr lang="en-US" altLang="ko-KR" sz="2000" dirty="0">
+                <a:hlinkClick r:id="rId2"/>
+              </a:rPr>
+              <a:t>https://www.forest.go.kr/kfsweb/opda/dataMng/pblicDataView.do?pblicDataId=PBD0000057&amp;tabs=3&amp;mn=NKFS_06_08_02</a:t>
+            </a:r>
+            <a:endParaRPr lang="en-US" altLang="ko-KR" sz="2000" dirty="0"/>
+          </a:p>
+          <a:p>
+            <a:pPr marL="0" indent="0">
+              <a:buNone/>
+            </a:pPr>
+            <a:r>
+              <a:rPr lang="en-US" altLang="ko-KR" sz="2000" dirty="0"/>
+              <a:t>Request (</a:t>
+            </a:r>
+            <a:r>
+              <a:rPr lang="ko-KR" altLang="en-US" sz="2000" dirty="0"/>
+              <a:t>인증</a:t>
+            </a:r>
+            <a:r>
+              <a:rPr lang="en-US" altLang="ko-KR" sz="2000" dirty="0"/>
+              <a:t>key,</a:t>
+            </a:r>
+            <a:r>
+              <a:rPr lang="ko-KR" altLang="en-US" sz="2000" dirty="0" err="1"/>
+              <a:t>식물명</a:t>
+            </a:r>
+            <a:r>
+              <a:rPr lang="en-US" altLang="ko-KR" sz="2000" dirty="0"/>
+              <a:t>,</a:t>
+            </a:r>
+            <a:r>
+              <a:rPr lang="ko-KR" altLang="en-US" sz="2000" dirty="0"/>
+              <a:t>페이지번호</a:t>
+            </a:r>
+            <a:r>
+              <a:rPr lang="en-US" altLang="ko-KR" sz="2000" dirty="0"/>
+              <a:t>,</a:t>
+            </a:r>
+            <a:r>
+              <a:rPr lang="ko-KR" altLang="en-US" sz="2000" dirty="0" err="1"/>
+              <a:t>표시항목수</a:t>
+            </a:r>
+            <a:r>
+              <a:rPr lang="en-US" altLang="ko-KR" sz="2000" dirty="0"/>
+              <a:t>)</a:t>
+            </a:r>
+          </a:p>
+          <a:p>
+            <a:pPr marL="0" indent="0">
+              <a:buNone/>
+            </a:pPr>
+            <a:r>
+              <a:rPr lang="en-US" altLang="ko-KR" sz="2000" dirty="0"/>
+              <a:t>Response(</a:t>
+            </a:r>
+            <a:r>
+              <a:rPr lang="ko-KR" altLang="en-US" sz="2000" dirty="0" err="1"/>
+              <a:t>식물명</a:t>
+            </a:r>
+            <a:r>
+              <a:rPr lang="en-US" altLang="ko-KR" sz="2000" dirty="0"/>
+              <a:t>,</a:t>
+            </a:r>
+            <a:r>
+              <a:rPr lang="ko-KR" altLang="en-US" sz="2000" dirty="0"/>
+              <a:t>영문명</a:t>
+            </a:r>
+            <a:r>
+              <a:rPr lang="en-US" altLang="ko-KR" sz="2000" dirty="0"/>
+              <a:t>,</a:t>
+            </a:r>
+            <a:r>
+              <a:rPr lang="ko-KR" altLang="en-US" sz="2000" dirty="0"/>
+              <a:t>학명</a:t>
+            </a:r>
+            <a:r>
+              <a:rPr lang="en-US" altLang="ko-KR" sz="2000" dirty="0"/>
+              <a:t>,</a:t>
+            </a:r>
+            <a:r>
+              <a:rPr lang="ko-KR" altLang="en-US" sz="2000" dirty="0"/>
+              <a:t>안내</a:t>
+            </a:r>
+            <a:r>
+              <a:rPr lang="en-US" altLang="ko-KR" sz="2000" dirty="0"/>
+              <a:t>,</a:t>
+            </a:r>
+            <a:r>
+              <a:rPr lang="ko-KR" altLang="en-US" sz="2000" dirty="0"/>
+              <a:t>서식장소</a:t>
+            </a:r>
+            <a:r>
+              <a:rPr lang="en-US" altLang="ko-KR" sz="2000" dirty="0"/>
+              <a:t>,</a:t>
+            </a:r>
+            <a:r>
+              <a:rPr lang="ko-KR" altLang="en-US" sz="2000" dirty="0"/>
+              <a:t>식물자료제공 등</a:t>
+            </a:r>
+            <a:r>
+              <a:rPr lang="en-US" altLang="ko-KR" sz="2000" dirty="0"/>
+              <a:t>)</a:t>
+            </a:r>
+            <a:endParaRPr lang="ko-KR" altLang="en-US" sz="2000" dirty="0"/>
+          </a:p>
+        </p:txBody>
+      </p:sp>
+    </p:spTree>
+    <p:extLst>
+      <p:ext uri="{BB962C8B-B14F-4D97-AF65-F5344CB8AC3E}">
+        <p14:creationId xmlns:p14="http://schemas.microsoft.com/office/powerpoint/2010/main" val="2944034965"/>
       </p:ext>
     </p:extLst>
   </p:cSld>
@@ -22387,7 +23588,7 @@
             </a:pPr>
             <a:r>
               <a:rPr lang="ko-KR" altLang="en-US" sz="1600" dirty="0"/>
-              <a:t>꽃 추가 등록 페이지                                                 꽃 정보 확인 페이지</a:t>
+              <a:t>꽃 추가 등록 페이지</a:t>
             </a:r>
           </a:p>
         </p:txBody>
@@ -22645,12 +23846,119 @@
           </a:p>
         </p:txBody>
       </p:sp>
+      <p:pic>
+        <p:nvPicPr>
+          <p:cNvPr id="4" name="그래픽 3" descr="카메라 윤곽선">
+            <a:extLst>
+              <a:ext uri="{FF2B5EF4-FFF2-40B4-BE49-F238E27FC236}">
+                <a16:creationId xmlns:a16="http://schemas.microsoft.com/office/drawing/2014/main" id="{55764D39-BCE3-C340-D3D6-A5411AB14194}"/>
+              </a:ext>
+            </a:extLst>
+          </p:cNvPr>
+          <p:cNvPicPr>
+            <a:picLocks noChangeAspect="1"/>
+          </p:cNvPicPr>
+          <p:nvPr/>
+        </p:nvPicPr>
+        <p:blipFill>
+          <a:blip r:embed="rId2">
+            <a:extLst>
+              <a:ext uri="{28A0092B-C50C-407E-A947-70E740481C1C}">
+                <a14:useLocalDpi xmlns:a14="http://schemas.microsoft.com/office/drawing/2010/main" val="0"/>
+              </a:ext>
+              <a:ext uri="{96DAC541-7B7A-43D3-8B79-37D633B846F1}">
+                <asvg:svgBlip xmlns:asvg="http://schemas.microsoft.com/office/drawing/2016/SVG/main" r:embed="rId3"/>
+              </a:ext>
+            </a:extLst>
+          </a:blip>
+          <a:stretch>
+            <a:fillRect/>
+          </a:stretch>
+        </p:blipFill>
+        <p:spPr>
+          <a:xfrm>
+            <a:off x="1843290" y="5059395"/>
+            <a:ext cx="472372" cy="472372"/>
+          </a:xfrm>
+          <a:prstGeom prst="rect">
+            <a:avLst/>
+          </a:prstGeom>
+        </p:spPr>
+      </p:pic>
+    </p:spTree>
+    <p:extLst>
+      <p:ext uri="{BB962C8B-B14F-4D97-AF65-F5344CB8AC3E}">
+        <p14:creationId xmlns:p14="http://schemas.microsoft.com/office/powerpoint/2010/main" val="1640294054"/>
+      </p:ext>
+    </p:extLst>
+  </p:cSld>
+  <p:clrMapOvr>
+    <a:masterClrMapping/>
+  </p:clrMapOvr>
+</p:sld>
+</file>
+
+<file path=ppt/slides/slide7.xml><?xml version="1.0" encoding="utf-8"?>
+<p:sld xmlns:a="http://schemas.openxmlformats.org/drawingml/2006/main" xmlns:r="http://schemas.openxmlformats.org/officeDocument/2006/relationships" xmlns:p="http://schemas.openxmlformats.org/presentationml/2006/main">
+  <p:cSld>
+    <p:spTree>
+      <p:nvGrpSpPr>
+        <p:cNvPr id="1" name=""/>
+        <p:cNvGrpSpPr/>
+        <p:nvPr/>
+      </p:nvGrpSpPr>
+      <p:grpSpPr>
+        <a:xfrm>
+          <a:off x="0" y="0"/>
+          <a:ext cx="0" cy="0"/>
+          <a:chOff x="0" y="0"/>
+          <a:chExt cx="0" cy="0"/>
+        </a:xfrm>
+      </p:grpSpPr>
       <p:sp>
         <p:nvSpPr>
-          <p:cNvPr id="34" name="직사각형 33">
+          <p:cNvPr id="3" name="내용 개체 틀 2">
             <a:extLst>
               <a:ext uri="{FF2B5EF4-FFF2-40B4-BE49-F238E27FC236}">
-                <a16:creationId xmlns:a16="http://schemas.microsoft.com/office/drawing/2014/main" id="{70FFCE55-AB5B-95D0-F7F7-C9F9ABB3FAFD}"/>
+                <a16:creationId xmlns:a16="http://schemas.microsoft.com/office/drawing/2014/main" id="{FFE85E15-07FF-51A4-64B7-6E1502970C7D}"/>
+              </a:ext>
+            </a:extLst>
+          </p:cNvPr>
+          <p:cNvSpPr>
+            <a:spLocks noGrp="1"/>
+          </p:cNvSpPr>
+          <p:nvPr>
+            <p:ph idx="1"/>
+          </p:nvPr>
+        </p:nvSpPr>
+        <p:spPr>
+          <a:xfrm>
+            <a:off x="495300" y="332657"/>
+            <a:ext cx="8915400" cy="5793508"/>
+          </a:xfrm>
+        </p:spPr>
+        <p:txBody>
+          <a:bodyPr>
+            <a:normAutofit/>
+          </a:bodyPr>
+          <a:lstStyle/>
+          <a:p>
+            <a:pPr marL="0" indent="0">
+              <a:buNone/>
+            </a:pPr>
+            <a:r>
+              <a:rPr lang="ko-KR" altLang="en-US" sz="1600" dirty="0"/>
+              <a:t>꽃 분류 확인 페이지</a:t>
+            </a:r>
+          </a:p>
+        </p:txBody>
+      </p:sp>
+      <p:sp>
+        <p:nvSpPr>
+          <p:cNvPr id="29" name="직사각형 28">
+            <a:extLst>
+              <a:ext uri="{FF2B5EF4-FFF2-40B4-BE49-F238E27FC236}">
+                <a16:creationId xmlns:a16="http://schemas.microsoft.com/office/drawing/2014/main" id="{02E77789-BD04-2377-94A8-4B37142E7ED1}"/>
               </a:ext>
             </a:extLst>
           </p:cNvPr>
@@ -22659,7 +23967,7 @@
         </p:nvSpPr>
         <p:spPr>
           <a:xfrm>
-            <a:off x="5950828" y="1268760"/>
+            <a:off x="495300" y="1268760"/>
             <a:ext cx="3168352" cy="4536504"/>
           </a:xfrm>
           <a:prstGeom prst="rect">
@@ -22694,6 +24002,123 @@
           </a:p>
         </p:txBody>
       </p:sp>
+    </p:spTree>
+    <p:extLst>
+      <p:ext uri="{BB962C8B-B14F-4D97-AF65-F5344CB8AC3E}">
+        <p14:creationId xmlns:p14="http://schemas.microsoft.com/office/powerpoint/2010/main" val="3867396485"/>
+      </p:ext>
+    </p:extLst>
+  </p:cSld>
+  <p:clrMapOvr>
+    <a:masterClrMapping/>
+  </p:clrMapOvr>
+</p:sld>
+</file>
+
+<file path=ppt/slides/slide8.xml><?xml version="1.0" encoding="utf-8"?>
+<p:sld xmlns:a="http://schemas.openxmlformats.org/drawingml/2006/main" xmlns:r="http://schemas.openxmlformats.org/officeDocument/2006/relationships" xmlns:p="http://schemas.openxmlformats.org/presentationml/2006/main">
+  <p:cSld>
+    <p:spTree>
+      <p:nvGrpSpPr>
+        <p:cNvPr id="1" name=""/>
+        <p:cNvGrpSpPr/>
+        <p:nvPr/>
+      </p:nvGrpSpPr>
+      <p:grpSpPr>
+        <a:xfrm>
+          <a:off x="0" y="0"/>
+          <a:ext cx="0" cy="0"/>
+          <a:chOff x="0" y="0"/>
+          <a:chExt cx="0" cy="0"/>
+        </a:xfrm>
+      </p:grpSpPr>
+      <p:sp>
+        <p:nvSpPr>
+          <p:cNvPr id="3" name="내용 개체 틀 2">
+            <a:extLst>
+              <a:ext uri="{FF2B5EF4-FFF2-40B4-BE49-F238E27FC236}">
+                <a16:creationId xmlns:a16="http://schemas.microsoft.com/office/drawing/2014/main" id="{FFE85E15-07FF-51A4-64B7-6E1502970C7D}"/>
+              </a:ext>
+            </a:extLst>
+          </p:cNvPr>
+          <p:cNvSpPr>
+            <a:spLocks noGrp="1"/>
+          </p:cNvSpPr>
+          <p:nvPr>
+            <p:ph idx="1"/>
+          </p:nvPr>
+        </p:nvSpPr>
+        <p:spPr>
+          <a:xfrm>
+            <a:off x="495300" y="332657"/>
+            <a:ext cx="8915400" cy="5793508"/>
+          </a:xfrm>
+        </p:spPr>
+        <p:txBody>
+          <a:bodyPr>
+            <a:normAutofit/>
+          </a:bodyPr>
+          <a:lstStyle/>
+          <a:p>
+            <a:pPr marL="0" indent="0">
+              <a:buNone/>
+            </a:pPr>
+            <a:r>
+              <a:rPr lang="ko-KR" altLang="en-US" sz="1600" dirty="0"/>
+              <a:t>꽃 정보 확인 페이지</a:t>
+            </a:r>
+          </a:p>
+        </p:txBody>
+      </p:sp>
+      <p:sp>
+        <p:nvSpPr>
+          <p:cNvPr id="34" name="직사각형 33">
+            <a:extLst>
+              <a:ext uri="{FF2B5EF4-FFF2-40B4-BE49-F238E27FC236}">
+                <a16:creationId xmlns:a16="http://schemas.microsoft.com/office/drawing/2014/main" id="{70FFCE55-AB5B-95D0-F7F7-C9F9ABB3FAFD}"/>
+              </a:ext>
+            </a:extLst>
+          </p:cNvPr>
+          <p:cNvSpPr/>
+          <p:nvPr/>
+        </p:nvSpPr>
+        <p:spPr>
+          <a:xfrm>
+            <a:off x="560512" y="1268760"/>
+            <a:ext cx="3168352" cy="4536504"/>
+          </a:xfrm>
+          <a:prstGeom prst="rect">
+            <a:avLst/>
+          </a:prstGeom>
+          <a:solidFill>
+            <a:schemeClr val="bg1"/>
+          </a:solidFill>
+        </p:spPr>
+        <p:style>
+          <a:lnRef idx="2">
+            <a:schemeClr val="accent1">
+              <a:shade val="50000"/>
+            </a:schemeClr>
+          </a:lnRef>
+          <a:fillRef idx="1">
+            <a:schemeClr val="accent1"/>
+          </a:fillRef>
+          <a:effectRef idx="0">
+            <a:schemeClr val="accent1"/>
+          </a:effectRef>
+          <a:fontRef idx="minor">
+            <a:schemeClr val="lt1"/>
+          </a:fontRef>
+        </p:style>
+        <p:txBody>
+          <a:bodyPr rtlCol="0" anchor="ctr"/>
+          <a:lstStyle/>
+          <a:p>
+            <a:pPr algn="ctr"/>
+            <a:endParaRPr lang="ko-KR" altLang="en-US" i="1" dirty="0"/>
+          </a:p>
+        </p:txBody>
+      </p:sp>
       <p:sp>
         <p:nvSpPr>
           <p:cNvPr id="35" name="TextBox 34">
@@ -22708,7 +24133,7 @@
         </p:nvSpPr>
         <p:spPr>
           <a:xfrm>
-            <a:off x="6096020" y="1455312"/>
+            <a:off x="705704" y="1455312"/>
             <a:ext cx="2664296" cy="369332"/>
           </a:xfrm>
           <a:prstGeom prst="rect">
@@ -22747,7 +24172,7 @@
         </p:nvSpPr>
         <p:spPr>
           <a:xfrm>
-            <a:off x="6096020" y="5276604"/>
+            <a:off x="705704" y="5276604"/>
             <a:ext cx="1080120" cy="216024"/>
           </a:xfrm>
           <a:prstGeom prst="rect">
@@ -22796,7 +24221,7 @@
         </p:nvSpPr>
         <p:spPr>
           <a:xfrm>
-            <a:off x="6168028" y="1964236"/>
+            <a:off x="777712" y="1964236"/>
             <a:ext cx="2728332" cy="1435997"/>
           </a:xfrm>
           <a:prstGeom prst="rect">
@@ -22852,7 +24277,7 @@
         </p:nvSpPr>
         <p:spPr>
           <a:xfrm>
-            <a:off x="6096020" y="3537012"/>
+            <a:off x="705704" y="3537012"/>
             <a:ext cx="2664296" cy="1631216"/>
           </a:xfrm>
           <a:prstGeom prst="rect">
@@ -22940,7 +24365,7 @@
     </p:spTree>
     <p:extLst>
       <p:ext uri="{BB962C8B-B14F-4D97-AF65-F5344CB8AC3E}">
-        <p14:creationId xmlns:p14="http://schemas.microsoft.com/office/powerpoint/2010/main" val="1640294054"/>
+        <p14:creationId xmlns:p14="http://schemas.microsoft.com/office/powerpoint/2010/main" val="1268713212"/>
       </p:ext>
     </p:extLst>
   </p:cSld>
@@ -22950,7 +24375,7 @@
 </p:sld>
 </file>
 
-<file path=ppt/slides/slide7.xml><?xml version="1.0" encoding="utf-8"?>
+<file path=ppt/slides/slide9.xml><?xml version="1.0" encoding="utf-8"?>
 <p:sld xmlns:a="http://schemas.openxmlformats.org/drawingml/2006/main" xmlns:r="http://schemas.openxmlformats.org/officeDocument/2006/relationships" xmlns:p="http://schemas.openxmlformats.org/presentationml/2006/main">
   <p:cSld>
     <p:spTree>
@@ -24780,335 +26205,6 @@
     <p:extLst>
       <p:ext uri="{BB962C8B-B14F-4D97-AF65-F5344CB8AC3E}">
         <p14:creationId xmlns:p14="http://schemas.microsoft.com/office/powerpoint/2010/main" val="204537751"/>
-      </p:ext>
-    </p:extLst>
-  </p:cSld>
-  <p:clrMapOvr>
-    <a:masterClrMapping/>
-  </p:clrMapOvr>
-</p:sld>
-</file>
-
-<file path=ppt/slides/slide8.xml><?xml version="1.0" encoding="utf-8"?>
-<p:sld xmlns:a="http://schemas.openxmlformats.org/drawingml/2006/main" xmlns:r="http://schemas.openxmlformats.org/officeDocument/2006/relationships" xmlns:p="http://schemas.openxmlformats.org/presentationml/2006/main">
-  <p:cSld>
-    <p:spTree>
-      <p:nvGrpSpPr>
-        <p:cNvPr id="1" name=""/>
-        <p:cNvGrpSpPr/>
-        <p:nvPr/>
-      </p:nvGrpSpPr>
-      <p:grpSpPr>
-        <a:xfrm>
-          <a:off x="0" y="0"/>
-          <a:ext cx="0" cy="0"/>
-          <a:chOff x="0" y="0"/>
-          <a:chExt cx="0" cy="0"/>
-        </a:xfrm>
-      </p:grpSpPr>
-      <p:sp>
-        <p:nvSpPr>
-          <p:cNvPr id="2" name="제목 1">
-            <a:extLst>
-              <a:ext uri="{FF2B5EF4-FFF2-40B4-BE49-F238E27FC236}">
-                <a16:creationId xmlns:a16="http://schemas.microsoft.com/office/drawing/2014/main" id="{55E140B0-DD8D-541A-CF6C-533BB1ADAD9B}"/>
-              </a:ext>
-            </a:extLst>
-          </p:cNvPr>
-          <p:cNvSpPr>
-            <a:spLocks noGrp="1"/>
-          </p:cNvSpPr>
-          <p:nvPr>
-            <p:ph type="title"/>
-          </p:nvPr>
-        </p:nvSpPr>
-        <p:spPr/>
-        <p:txBody>
-          <a:bodyPr>
-            <a:normAutofit/>
-          </a:bodyPr>
-          <a:lstStyle/>
-          <a:p>
-            <a:r>
-              <a:rPr lang="en-US" altLang="ko-KR" dirty="0" err="1"/>
-              <a:t>DataBase</a:t>
-            </a:r>
-            <a:r>
-              <a:rPr lang="en-US" altLang="ko-KR" dirty="0"/>
-              <a:t> Schema</a:t>
-            </a:r>
-            <a:endParaRPr lang="ko-KR" altLang="en-US" dirty="0"/>
-          </a:p>
-        </p:txBody>
-      </p:sp>
-    </p:spTree>
-    <p:extLst>
-      <p:ext uri="{BB962C8B-B14F-4D97-AF65-F5344CB8AC3E}">
-        <p14:creationId xmlns:p14="http://schemas.microsoft.com/office/powerpoint/2010/main" val="322434159"/>
-      </p:ext>
-    </p:extLst>
-  </p:cSld>
-  <p:clrMapOvr>
-    <a:masterClrMapping/>
-  </p:clrMapOvr>
-</p:sld>
-</file>
-
-<file path=ppt/slides/slide9.xml><?xml version="1.0" encoding="utf-8"?>
-<p:sld xmlns:a="http://schemas.openxmlformats.org/drawingml/2006/main" xmlns:r="http://schemas.openxmlformats.org/officeDocument/2006/relationships" xmlns:p="http://schemas.openxmlformats.org/presentationml/2006/main">
-  <p:cSld>
-    <p:spTree>
-      <p:nvGrpSpPr>
-        <p:cNvPr id="1" name=""/>
-        <p:cNvGrpSpPr/>
-        <p:nvPr/>
-      </p:nvGrpSpPr>
-      <p:grpSpPr>
-        <a:xfrm>
-          <a:off x="0" y="0"/>
-          <a:ext cx="0" cy="0"/>
-          <a:chOff x="0" y="0"/>
-          <a:chExt cx="0" cy="0"/>
-        </a:xfrm>
-      </p:grpSpPr>
-      <p:sp>
-        <p:nvSpPr>
-          <p:cNvPr id="2" name="제목 1">
-            <a:extLst>
-              <a:ext uri="{FF2B5EF4-FFF2-40B4-BE49-F238E27FC236}">
-                <a16:creationId xmlns:a16="http://schemas.microsoft.com/office/drawing/2014/main" id="{11687D24-70FC-655B-1EC8-3A87D0F3E3E3}"/>
-              </a:ext>
-            </a:extLst>
-          </p:cNvPr>
-          <p:cNvSpPr>
-            <a:spLocks noGrp="1"/>
-          </p:cNvSpPr>
-          <p:nvPr>
-            <p:ph type="title"/>
-          </p:nvPr>
-        </p:nvSpPr>
-        <p:spPr/>
-        <p:txBody>
-          <a:bodyPr/>
-          <a:lstStyle/>
-          <a:p>
-            <a:r>
-              <a:rPr lang="en-US" altLang="ko-KR" dirty="0" err="1"/>
-              <a:t>Plantgram</a:t>
-            </a:r>
-            <a:endParaRPr lang="ko-KR" altLang="en-US" dirty="0"/>
-          </a:p>
-        </p:txBody>
-      </p:sp>
-      <p:sp>
-        <p:nvSpPr>
-          <p:cNvPr id="3" name="내용 개체 틀 2">
-            <a:extLst>
-              <a:ext uri="{FF2B5EF4-FFF2-40B4-BE49-F238E27FC236}">
-                <a16:creationId xmlns:a16="http://schemas.microsoft.com/office/drawing/2014/main" id="{61430AE8-CBB1-EB9F-1616-181F87A1182A}"/>
-              </a:ext>
-            </a:extLst>
-          </p:cNvPr>
-          <p:cNvSpPr>
-            <a:spLocks noGrp="1"/>
-          </p:cNvSpPr>
-          <p:nvPr>
-            <p:ph idx="1"/>
-          </p:nvPr>
-        </p:nvSpPr>
-        <p:spPr/>
-        <p:txBody>
-          <a:bodyPr>
-            <a:normAutofit/>
-          </a:bodyPr>
-          <a:lstStyle/>
-          <a:p>
-            <a:r>
-              <a:rPr lang="ko-KR" altLang="en-US" sz="2000" dirty="0"/>
-              <a:t>식물등록은 품종 리스트에서 직접 선택 </a:t>
-            </a:r>
-            <a:r>
-              <a:rPr lang="en-US" altLang="ko-KR" sz="2000" dirty="0"/>
-              <a:t>( </a:t>
-            </a:r>
-            <a:r>
-              <a:rPr lang="ko-KR" altLang="en-US" sz="2000" dirty="0"/>
-              <a:t>분류모델 </a:t>
-            </a:r>
-            <a:r>
-              <a:rPr lang="ko-KR" altLang="en-US" sz="2000" dirty="0" err="1"/>
-              <a:t>쓰지않음</a:t>
-            </a:r>
-            <a:r>
-              <a:rPr lang="en-US" altLang="ko-KR" sz="2000" dirty="0"/>
-              <a:t>)</a:t>
-            </a:r>
-          </a:p>
-          <a:p>
-            <a:r>
-              <a:rPr lang="ko-KR" altLang="en-US" sz="2000" dirty="0"/>
-              <a:t>식물정보 </a:t>
-            </a:r>
-            <a:r>
-              <a:rPr lang="en-US" altLang="ko-KR" sz="2000" dirty="0"/>
-              <a:t>( </a:t>
-            </a:r>
-            <a:r>
-              <a:rPr lang="ko-KR" altLang="en-US" sz="2000" dirty="0"/>
-              <a:t>회사내에 식물정보 데이터베이스가 있는듯 </a:t>
-            </a:r>
-            <a:r>
-              <a:rPr lang="en-US" altLang="ko-KR" sz="2000" dirty="0"/>
-              <a:t>)</a:t>
-            </a:r>
-          </a:p>
-          <a:p>
-            <a:pPr lvl="1"/>
-            <a:r>
-              <a:rPr lang="ko-KR" altLang="en-US" sz="1600" dirty="0"/>
-              <a:t>식물 사진 </a:t>
-            </a:r>
-            <a:r>
-              <a:rPr lang="en-US" altLang="ko-KR" sz="1600" dirty="0"/>
-              <a:t># </a:t>
-            </a:r>
-            <a:r>
-              <a:rPr lang="ko-KR" altLang="en-US" sz="1600" dirty="0"/>
-              <a:t>직접 등록</a:t>
-            </a:r>
-            <a:endParaRPr lang="en-US" altLang="ko-KR" sz="1600" dirty="0"/>
-          </a:p>
-          <a:p>
-            <a:pPr lvl="1"/>
-            <a:r>
-              <a:rPr lang="ko-KR" altLang="en-US" sz="1600" dirty="0"/>
-              <a:t>등록일자</a:t>
-            </a:r>
-            <a:r>
-              <a:rPr lang="en-US" altLang="ko-KR" sz="1600" dirty="0"/>
-              <a:t>,</a:t>
-            </a:r>
-            <a:r>
-              <a:rPr lang="ko-KR" altLang="en-US" sz="1600" dirty="0" err="1"/>
-              <a:t>마지막으로물준날</a:t>
-            </a:r>
-            <a:endParaRPr lang="en-US" altLang="ko-KR" sz="1600" dirty="0"/>
-          </a:p>
-          <a:p>
-            <a:pPr lvl="1"/>
-            <a:r>
-              <a:rPr lang="ko-KR" altLang="en-US" sz="1600" dirty="0"/>
-              <a:t>적절한 햇빛</a:t>
-            </a:r>
-            <a:r>
-              <a:rPr lang="en-US" altLang="ko-KR" sz="1600" dirty="0"/>
-              <a:t>,</a:t>
-            </a:r>
-            <a:r>
-              <a:rPr lang="ko-KR" altLang="en-US" sz="1600" dirty="0"/>
-              <a:t>물</a:t>
-            </a:r>
-            <a:r>
-              <a:rPr lang="en-US" altLang="ko-KR" sz="1600" dirty="0"/>
-              <a:t>,</a:t>
-            </a:r>
-            <a:r>
-              <a:rPr lang="ko-KR" altLang="en-US" sz="1600" dirty="0"/>
-              <a:t>온도 및 관리 주기 </a:t>
-            </a:r>
-            <a:r>
-              <a:rPr lang="en-US" altLang="ko-KR" sz="1600" dirty="0"/>
-              <a:t># </a:t>
-            </a:r>
-            <a:r>
-              <a:rPr lang="ko-KR" altLang="en-US" sz="1600" dirty="0"/>
-              <a:t>기본값이 있지만 변경가능</a:t>
-            </a:r>
-            <a:endParaRPr lang="en-US" altLang="ko-KR" sz="1600" dirty="0"/>
-          </a:p>
-          <a:p>
-            <a:pPr lvl="1"/>
-            <a:r>
-              <a:rPr lang="ko-KR" altLang="en-US" sz="1600" dirty="0"/>
-              <a:t>최근 관리내역 </a:t>
-            </a:r>
-            <a:r>
-              <a:rPr lang="en-US" altLang="ko-KR" sz="1600" dirty="0"/>
-              <a:t># </a:t>
-            </a:r>
-            <a:r>
-              <a:rPr lang="ko-KR" altLang="en-US" sz="1600" dirty="0"/>
-              <a:t>자동 등록</a:t>
-            </a:r>
-            <a:endParaRPr lang="en-US" altLang="ko-KR" sz="1600" dirty="0"/>
-          </a:p>
-          <a:p>
-            <a:r>
-              <a:rPr lang="ko-KR" altLang="en-US" sz="2000" dirty="0" err="1"/>
-              <a:t>식물별</a:t>
-            </a:r>
-            <a:r>
-              <a:rPr lang="ko-KR" altLang="en-US" sz="2000" dirty="0"/>
-              <a:t> </a:t>
-            </a:r>
-            <a:r>
-              <a:rPr lang="en-US" altLang="ko-KR" sz="2000" dirty="0" err="1"/>
-              <a:t>qr</a:t>
-            </a:r>
-            <a:r>
-              <a:rPr lang="ko-KR" altLang="en-US" sz="2000" dirty="0"/>
-              <a:t>코드 생성 후 </a:t>
-            </a:r>
-            <a:r>
-              <a:rPr lang="ko-KR" altLang="en-US" sz="2000" dirty="0" err="1"/>
-              <a:t>물줬다는</a:t>
-            </a:r>
-            <a:r>
-              <a:rPr lang="ko-KR" altLang="en-US" sz="2000" dirty="0"/>
-              <a:t> 확인을 </a:t>
-            </a:r>
-            <a:r>
-              <a:rPr lang="en-US" altLang="ko-KR" sz="2000" dirty="0" err="1"/>
-              <a:t>qr</a:t>
-            </a:r>
-            <a:r>
-              <a:rPr lang="ko-KR" altLang="en-US" sz="2000" dirty="0"/>
-              <a:t>코드로 </a:t>
-            </a:r>
-            <a:r>
-              <a:rPr lang="ko-KR" altLang="en-US" sz="2000" dirty="0" err="1"/>
-              <a:t>직접함</a:t>
-            </a:r>
-            <a:endParaRPr lang="en-US" altLang="ko-KR" sz="2000" dirty="0"/>
-          </a:p>
-          <a:p>
-            <a:r>
-              <a:rPr lang="ko-KR" altLang="en-US" sz="2000" dirty="0"/>
-              <a:t>식물관련 도구 및 가구장터</a:t>
-            </a:r>
-            <a:endParaRPr lang="en-US" altLang="ko-KR" sz="2000" dirty="0"/>
-          </a:p>
-          <a:p>
-            <a:r>
-              <a:rPr lang="ko-KR" altLang="en-US" sz="2000" dirty="0" err="1"/>
-              <a:t>사용자들간에</a:t>
-            </a:r>
-            <a:r>
-              <a:rPr lang="ko-KR" altLang="en-US" sz="2000" dirty="0"/>
-              <a:t> 식물관리정보 공유 및 질의응답</a:t>
-            </a:r>
-            <a:endParaRPr lang="en-US" altLang="ko-KR" sz="2000" dirty="0"/>
-          </a:p>
-          <a:p>
-            <a:pPr lvl="1"/>
-            <a:endParaRPr lang="en-US" altLang="ko-KR" sz="1600" dirty="0"/>
-          </a:p>
-        </p:txBody>
-      </p:sp>
-    </p:spTree>
-    <p:extLst>
-      <p:ext uri="{BB962C8B-B14F-4D97-AF65-F5344CB8AC3E}">
-        <p14:creationId xmlns:p14="http://schemas.microsoft.com/office/powerpoint/2010/main" val="407826983"/>
       </p:ext>
     </p:extLst>
   </p:cSld>

</xml_diff>